<commit_message>
Uploading updated project proposal and parts list
</commit_message>
<xml_diff>
--- a/project_01/docs/McGill_ENGI301_project_01_proposal.pptx
+++ b/project_01/docs/McGill_ENGI301_project_01_proposal.pptx
@@ -219,7 +219,7 @@
           <a:p>
             <a:fld id="{59041DB8-B66F-4DC8-A96E-33677E0F90FF}" type="datetimeFigureOut">
               <a:rPr lang="en-US" smtClean="0"/>
-              <a:t>9/25/23</a:t>
+              <a:t>10/1/23</a:t>
             </a:fld>
             <a:endParaRPr lang="en-US"/>
           </a:p>
@@ -384,7 +384,7 @@
           <a:p>
             <a:fld id="{DEB49C4A-65AC-492D-9701-81B46C3AD0E4}" type="datetimeFigureOut">
               <a:rPr lang="en-US" smtClean="0"/>
-              <a:t>9/25/23</a:t>
+              <a:t>10/1/23</a:t>
             </a:fld>
             <a:endParaRPr lang="en-US"/>
           </a:p>
@@ -2792,7 +2792,7 @@
           <a:p>
             <a:fld id="{384A29A4-78C8-47AB-BA06-22CB45938951}" type="datetime1">
               <a:rPr lang="en-US" smtClean="0"/>
-              <a:t>9/25/23</a:t>
+              <a:t>10/1/23</a:t>
             </a:fld>
             <a:endParaRPr lang="en-US"/>
           </a:p>
@@ -2987,7 +2987,7 @@
           <a:p>
             <a:fld id="{E1ED4ACF-2D82-46F2-A8E9-23963AA34E86}" type="datetime1">
               <a:rPr lang="en-US" smtClean="0"/>
-              <a:t>9/25/23</a:t>
+              <a:t>10/1/23</a:t>
             </a:fld>
             <a:endParaRPr lang="en-US"/>
           </a:p>
@@ -3181,7 +3181,7 @@
           <a:p>
             <a:fld id="{AE374B5B-21A0-4192-BF4C-38187F1A68D8}" type="datetime1">
               <a:rPr lang="en-US" smtClean="0"/>
-              <a:t>9/25/23</a:t>
+              <a:t>10/1/23</a:t>
             </a:fld>
             <a:endParaRPr lang="en-US"/>
           </a:p>
@@ -5522,7 +5522,7 @@
           <a:p>
             <a:fld id="{33B5CF7C-B333-48E1-A4A6-83A3C8B73AC0}" type="datetime1">
               <a:rPr lang="en-US" smtClean="0"/>
-              <a:t>9/25/23</a:t>
+              <a:t>10/1/23</a:t>
             </a:fld>
             <a:endParaRPr lang="en-US"/>
           </a:p>
@@ -5975,7 +5975,7 @@
           <a:p>
             <a:fld id="{AE320762-5CBF-4210-AB54-376B091119F8}" type="datetime1">
               <a:rPr lang="en-US" smtClean="0"/>
-              <a:t>9/25/23</a:t>
+              <a:t>10/1/23</a:t>
             </a:fld>
             <a:endParaRPr lang="en-US"/>
           </a:p>
@@ -6107,7 +6107,7 @@
           <a:p>
             <a:fld id="{7F0DB371-BF5F-4058-A212-1A908E4D2674}" type="datetime1">
               <a:rPr lang="en-US" smtClean="0"/>
-              <a:t>9/25/23</a:t>
+              <a:t>10/1/23</a:t>
             </a:fld>
             <a:endParaRPr lang="en-US"/>
           </a:p>
@@ -8040,7 +8040,7 @@
           <a:p>
             <a:fld id="{60A4083B-90AA-48CF-BAD5-00AA24D7F288}" type="datetime1">
               <a:rPr lang="en-US" smtClean="0"/>
-              <a:t>9/25/23</a:t>
+              <a:t>10/1/23</a:t>
             </a:fld>
             <a:endParaRPr lang="en-US"/>
           </a:p>
@@ -10299,7 +10299,7 @@
             <a:fld id="{F5BAF629-ECA2-4CF3-B790-9D9BDED98269}" type="datetime1">
               <a:rPr lang="en-US" smtClean="0"/>
               <a:pPr/>
-              <a:t>9/25/23</a:t>
+              <a:t>10/1/23</a:t>
             </a:fld>
             <a:endParaRPr lang="en-US"/>
           </a:p>
@@ -14594,7 +14594,7 @@
             <a:fld id="{B51B2453-8663-4C69-AF73-9FD7B1DEC5D0}" type="datetime1">
               <a:rPr lang="en-US" smtClean="0"/>
               <a:pPr/>
-              <a:t>9/25/23</a:t>
+              <a:t>10/1/23</a:t>
             </a:fld>
             <a:endParaRPr lang="en-US" dirty="0"/>
           </a:p>
@@ -15118,7 +15118,7 @@
           <a:p>
             <a:r>
               <a:rPr lang="en-US" dirty="0"/>
-              <a:t>09/25/2023</a:t>
+              <a:t>10/01/2023</a:t>
             </a:r>
           </a:p>
           <a:p>
@@ -15229,21 +15229,21 @@
           <a:p>
             <a:r>
               <a:rPr lang="en-US" dirty="0"/>
-              <a:t>One-handed piano will teach beginner pianists how to play simple songs through memorization and repetition of a light sequence</a:t>
+              <a:t>My one-handed piano will teach beginner pianists how to play simple songs through memorization and repetition of a light sequence.</a:t>
             </a:r>
           </a:p>
           <a:p>
             <a:pPr lvl="1"/>
             <a:r>
               <a:rPr lang="en-US" dirty="0"/>
-              <a:t>Lights corresponding to a given key will illuminate in a given sequence</a:t>
+              <a:t>Lights corresponding to a given key will illuminate in a given sequence.</a:t>
             </a:r>
           </a:p>
           <a:p>
             <a:pPr lvl="1"/>
             <a:r>
               <a:rPr lang="en-US" dirty="0"/>
-              <a:t>Users will press the correct buttons in the correct order to play a simple song</a:t>
+              <a:t>Users will press the correct buttons in the correct order to play a simple song.</a:t>
             </a:r>
           </a:p>
           <a:p>
@@ -15431,7 +15431,7 @@
         </p:spPr>
         <p:txBody>
           <a:bodyPr>
-            <a:normAutofit/>
+            <a:normAutofit fontScale="92500" lnSpcReduction="10000"/>
           </a:bodyPr>
           <a:lstStyle/>
           <a:p>
@@ -15456,7 +15456,7 @@
             </a:r>
             <a:r>
               <a:rPr lang="en-US" dirty="0"/>
-              <a:t> will help me in getting the lights to illuminate in a certain order</a:t>
+              <a:t> shows how to illuminate lights in a certain order.</a:t>
             </a:r>
           </a:p>
           <a:p>
@@ -15479,9 +15479,28 @@
             </a:r>
           </a:p>
           <a:p>
+            <a:pPr lvl="1"/>
+            <a:r>
+              <a:rPr lang="en-US" dirty="0">
+                <a:hlinkClick r:id="rId4">
+                  <a:extLst>
+                    <a:ext uri="{A12FA001-AC4F-418D-AE19-62706E023703}">
+                      <ahyp:hlinkClr xmlns:ahyp="http://schemas.microsoft.com/office/drawing/2018/hyperlinkcolor" val="tx"/>
+                    </a:ext>
+                  </a:extLst>
+                </a:hlinkClick>
+              </a:rPr>
+              <a:t>Music Box</a:t>
+            </a:r>
             <a:r>
               <a:rPr lang="en-US" dirty="0"/>
-              <a:t>My project will combine aspects of both of the above projects to display lights in a given sequence that will correspond to the buttons to press to play a song on my piano. </a:t>
+              <a:t> uses USB speakers to play music and includes the LCD screen I plan to use. </a:t>
+            </a:r>
+          </a:p>
+          <a:p>
+            <a:r>
+              <a:rPr lang="en-US" dirty="0"/>
+              <a:t>My project will combine aspects of the above projects to display lights in a given sequence that will correspond to the buttons to press to play a song on my piano. </a:t>
             </a:r>
           </a:p>
         </p:txBody>
@@ -15501,7 +15520,7 @@
           <p:nvPr/>
         </p:nvPicPr>
         <p:blipFill>
-          <a:blip r:embed="rId4">
+          <a:blip r:embed="rId5">
             <a:extLst>
               <a:ext uri="{28A0092B-C50C-407E-A947-70E740481C1C}">
                 <a14:useLocalDpi xmlns:a14="http://schemas.microsoft.com/office/drawing/2010/main" val="0"/>
@@ -15515,8 +15534,8 @@
         </p:blipFill>
         <p:spPr bwMode="auto">
           <a:xfrm>
-            <a:off x="1644625" y="3276600"/>
-            <a:ext cx="3651275" cy="2378263"/>
+            <a:off x="730620" y="3429000"/>
+            <a:ext cx="3492384" cy="2274769"/>
           </a:xfrm>
           <a:prstGeom prst="rect">
             <a:avLst/>
@@ -15548,7 +15567,7 @@
           <p:nvPr/>
         </p:nvPicPr>
         <p:blipFill>
-          <a:blip r:embed="rId5">
+          <a:blip r:embed="rId6">
             <a:extLst>
               <a:ext uri="{28A0092B-C50C-407E-A947-70E740481C1C}">
                 <a14:useLocalDpi xmlns:a14="http://schemas.microsoft.com/office/drawing/2010/main" val="0"/>
@@ -15562,8 +15581,8 @@
         </p:blipFill>
         <p:spPr bwMode="auto">
           <a:xfrm>
-            <a:off x="6547568" y="3236030"/>
-            <a:ext cx="3225111" cy="2418833"/>
+            <a:off x="4762500" y="3429000"/>
+            <a:ext cx="3035808" cy="2276856"/>
           </a:xfrm>
           <a:prstGeom prst="rect">
             <a:avLst/>
@@ -15594,7 +15613,7 @@
         </p:nvSpPr>
         <p:spPr>
           <a:xfrm>
-            <a:off x="1277396" y="5695433"/>
+            <a:off x="323421" y="5703769"/>
             <a:ext cx="4385732" cy="369332"/>
           </a:xfrm>
           <a:prstGeom prst="rect">
@@ -15639,7 +15658,7 @@
         </p:nvSpPr>
         <p:spPr>
           <a:xfrm>
-            <a:off x="6102723" y="5726061"/>
+            <a:off x="4262496" y="5703769"/>
             <a:ext cx="4114800" cy="369332"/>
           </a:xfrm>
           <a:prstGeom prst="rect">
@@ -15661,6 +15680,89 @@
             <a:r>
               <a:rPr lang="en-US" dirty="0"/>
               <a:t> Synthesizer</a:t>
+            </a:r>
+          </a:p>
+        </p:txBody>
+      </p:sp>
+      <p:pic>
+        <p:nvPicPr>
+          <p:cNvPr id="1026" name="Picture 2" descr="Music Box">
+            <a:extLst>
+              <a:ext uri="{FF2B5EF4-FFF2-40B4-BE49-F238E27FC236}">
+                <a16:creationId xmlns:a16="http://schemas.microsoft.com/office/drawing/2014/main" id="{C771D23D-5828-ECCE-9C24-59392C3A1185}"/>
+              </a:ext>
+            </a:extLst>
+          </p:cNvPr>
+          <p:cNvPicPr>
+            <a:picLocks noChangeAspect="1" noChangeArrowheads="1"/>
+          </p:cNvPicPr>
+          <p:nvPr/>
+        </p:nvPicPr>
+        <p:blipFill>
+          <a:blip r:embed="rId7">
+            <a:extLst>
+              <a:ext uri="{28A0092B-C50C-407E-A947-70E740481C1C}">
+                <a14:useLocalDpi xmlns:a14="http://schemas.microsoft.com/office/drawing/2010/main" val="0"/>
+              </a:ext>
+            </a:extLst>
+          </a:blip>
+          <a:srcRect/>
+          <a:stretch>
+            <a:fillRect/>
+          </a:stretch>
+        </p:blipFill>
+        <p:spPr bwMode="auto">
+          <a:xfrm>
+            <a:off x="8377296" y="3427956"/>
+            <a:ext cx="3035808" cy="2276856"/>
+          </a:xfrm>
+          <a:prstGeom prst="rect">
+            <a:avLst/>
+          </a:prstGeom>
+          <a:noFill/>
+          <a:extLst>
+            <a:ext uri="{909E8E84-426E-40DD-AFC4-6F175D3DCCD1}">
+              <a14:hiddenFill xmlns:a14="http://schemas.microsoft.com/office/drawing/2010/main">
+                <a:solidFill>
+                  <a:srgbClr val="FFFFFF"/>
+                </a:solidFill>
+              </a14:hiddenFill>
+            </a:ext>
+          </a:extLst>
+        </p:spPr>
+      </p:pic>
+      <p:sp>
+        <p:nvSpPr>
+          <p:cNvPr id="6" name="TextBox 5">
+            <a:extLst>
+              <a:ext uri="{FF2B5EF4-FFF2-40B4-BE49-F238E27FC236}">
+                <a16:creationId xmlns:a16="http://schemas.microsoft.com/office/drawing/2014/main" id="{8BC12957-37B6-60AC-47A0-4CA88064679D}"/>
+              </a:ext>
+            </a:extLst>
+          </p:cNvPr>
+          <p:cNvSpPr txBox="1"/>
+          <p:nvPr/>
+        </p:nvSpPr>
+        <p:spPr>
+          <a:xfrm>
+            <a:off x="9094717" y="5703769"/>
+            <a:ext cx="1600966" cy="369332"/>
+          </a:xfrm>
+          <a:prstGeom prst="rect">
+            <a:avLst/>
+          </a:prstGeom>
+          <a:noFill/>
+        </p:spPr>
+        <p:txBody>
+          <a:bodyPr wrap="square" rtlCol="0">
+            <a:spAutoFit/>
+          </a:bodyPr>
+          <a:lstStyle/>
+          <a:p>
+            <a:pPr algn="ctr"/>
+            <a:r>
+              <a:rPr lang="en-US" dirty="0"/>
+              <a:t>Music Box</a:t>
             </a:r>
           </a:p>
         </p:txBody>
@@ -15737,55 +15839,6 @@
       </p:sp>
       <p:sp>
         <p:nvSpPr>
-          <p:cNvPr id="3" name="Content Placeholder 2">
-            <a:extLst>
-              <a:ext uri="{FF2B5EF4-FFF2-40B4-BE49-F238E27FC236}">
-                <a16:creationId xmlns:a16="http://schemas.microsoft.com/office/drawing/2014/main" id="{608935D3-29E1-4175-8DE5-14986150C19C}"/>
-              </a:ext>
-            </a:extLst>
-          </p:cNvPr>
-          <p:cNvSpPr>
-            <a:spLocks noGrp="1"/>
-          </p:cNvSpPr>
-          <p:nvPr>
-            <p:ph idx="1"/>
-          </p:nvPr>
-        </p:nvSpPr>
-        <p:spPr>
-          <a:xfrm>
-            <a:off x="9308384" y="1886534"/>
-            <a:ext cx="2522565" cy="3084931"/>
-          </a:xfrm>
-        </p:spPr>
-        <p:txBody>
-          <a:bodyPr>
-            <a:normAutofit lnSpcReduction="10000"/>
-          </a:bodyPr>
-          <a:lstStyle/>
-          <a:p>
-            <a:r>
-              <a:rPr lang="en-US" dirty="0"/>
-              <a:t>Questions</a:t>
-            </a:r>
-          </a:p>
-          <a:p>
-            <a:pPr lvl="1"/>
-            <a:r>
-              <a:rPr lang="en-US" dirty="0"/>
-              <a:t>Why does the speaker have to be PWM? Is this due to sound being a modulating signal?</a:t>
-            </a:r>
-          </a:p>
-          <a:p>
-            <a:pPr lvl="1"/>
-            <a:r>
-              <a:rPr lang="en-US" dirty="0"/>
-              <a:t>Can the switch be a GPIO input? I wasn’t sure how to figure that out. </a:t>
-            </a:r>
-          </a:p>
-        </p:txBody>
-      </p:sp>
-      <p:sp>
-        <p:nvSpPr>
           <p:cNvPr id="5" name="Rounded Rectangle 4">
             <a:extLst>
               <a:ext uri="{FF2B5EF4-FFF2-40B4-BE49-F238E27FC236}">
@@ -15798,7 +15851,7 @@
         </p:nvSpPr>
         <p:spPr>
           <a:xfrm>
-            <a:off x="3039340" y="1638300"/>
+            <a:off x="4267200" y="1638300"/>
             <a:ext cx="3657600" cy="4000500"/>
           </a:xfrm>
           <a:prstGeom prst="roundRect">
@@ -15832,10 +15885,10 @@
       </p:sp>
       <p:sp>
         <p:nvSpPr>
-          <p:cNvPr id="6" name="Rounded Rectangle 5">
+          <p:cNvPr id="8" name="Rounded Rectangle 7">
             <a:extLst>
               <a:ext uri="{FF2B5EF4-FFF2-40B4-BE49-F238E27FC236}">
-                <a16:creationId xmlns:a16="http://schemas.microsoft.com/office/drawing/2014/main" id="{C42FEDB8-1F1C-F408-8471-EB10CFFB3766}"/>
+                <a16:creationId xmlns:a16="http://schemas.microsoft.com/office/drawing/2014/main" id="{6F4C9950-36C4-1DFA-43BE-0F0941183841}"/>
               </a:ext>
             </a:extLst>
           </p:cNvPr>
@@ -15844,8 +15897,8 @@
         </p:nvSpPr>
         <p:spPr>
           <a:xfrm>
-            <a:off x="361051" y="2286000"/>
-            <a:ext cx="1728214" cy="685800"/>
+            <a:off x="8874874" y="4423741"/>
+            <a:ext cx="1907425" cy="924962"/>
           </a:xfrm>
           <a:prstGeom prst="roundRect">
             <a:avLst/>
@@ -15874,168 +15927,14 @@
             <a:pPr algn="ctr"/>
             <a:r>
               <a:rPr lang="en-US" dirty="0"/>
-              <a:t>Speaker</a:t>
+              <a:t>LCD Touchscreen</a:t>
             </a:r>
           </a:p>
           <a:p>
             <a:pPr algn="ctr"/>
             <a:r>
               <a:rPr lang="en-US" dirty="0"/>
-              <a:t>PRT-20660</a:t>
-            </a:r>
-          </a:p>
-        </p:txBody>
-      </p:sp>
-      <p:sp>
-        <p:nvSpPr>
-          <p:cNvPr id="7" name="Rounded Rectangle 6">
-            <a:extLst>
-              <a:ext uri="{FF2B5EF4-FFF2-40B4-BE49-F238E27FC236}">
-                <a16:creationId xmlns:a16="http://schemas.microsoft.com/office/drawing/2014/main" id="{CB0FCC5D-0C68-25C5-C62A-FD3E8E0F8894}"/>
-              </a:ext>
-            </a:extLst>
-          </p:cNvPr>
-          <p:cNvSpPr/>
-          <p:nvPr/>
-        </p:nvSpPr>
-        <p:spPr>
-          <a:xfrm>
-            <a:off x="7647015" y="3673879"/>
-            <a:ext cx="1660468" cy="685800"/>
-          </a:xfrm>
-          <a:prstGeom prst="roundRect">
-            <a:avLst/>
-          </a:prstGeom>
-        </p:spPr>
-        <p:style>
-          <a:lnRef idx="2">
-            <a:schemeClr val="accent1">
-              <a:shade val="15000"/>
-            </a:schemeClr>
-          </a:lnRef>
-          <a:fillRef idx="1">
-            <a:schemeClr val="accent1"/>
-          </a:fillRef>
-          <a:effectRef idx="0">
-            <a:schemeClr val="accent1"/>
-          </a:effectRef>
-          <a:fontRef idx="minor">
-            <a:schemeClr val="lt1"/>
-          </a:fontRef>
-        </p:style>
-        <p:txBody>
-          <a:bodyPr rtlCol="0" anchor="ctr"/>
-          <a:lstStyle/>
-          <a:p>
-            <a:pPr algn="ctr"/>
-            <a:r>
-              <a:rPr lang="en-US" dirty="0"/>
-              <a:t>LEDs</a:t>
-            </a:r>
-          </a:p>
-        </p:txBody>
-      </p:sp>
-      <p:sp>
-        <p:nvSpPr>
-          <p:cNvPr id="8" name="Rounded Rectangle 7">
-            <a:extLst>
-              <a:ext uri="{FF2B5EF4-FFF2-40B4-BE49-F238E27FC236}">
-                <a16:creationId xmlns:a16="http://schemas.microsoft.com/office/drawing/2014/main" id="{6F4C9950-36C4-1DFA-43BE-0F0941183841}"/>
-              </a:ext>
-            </a:extLst>
-          </p:cNvPr>
-          <p:cNvSpPr/>
-          <p:nvPr/>
-        </p:nvSpPr>
-        <p:spPr>
-          <a:xfrm>
-            <a:off x="7647015" y="4546022"/>
-            <a:ext cx="1678894" cy="685800"/>
-          </a:xfrm>
-          <a:prstGeom prst="roundRect">
-            <a:avLst/>
-          </a:prstGeom>
-        </p:spPr>
-        <p:style>
-          <a:lnRef idx="2">
-            <a:schemeClr val="accent1">
-              <a:shade val="15000"/>
-            </a:schemeClr>
-          </a:lnRef>
-          <a:fillRef idx="1">
-            <a:schemeClr val="accent1"/>
-          </a:fillRef>
-          <a:effectRef idx="0">
-            <a:schemeClr val="accent1"/>
-          </a:effectRef>
-          <a:fontRef idx="minor">
-            <a:schemeClr val="lt1"/>
-          </a:fontRef>
-        </p:style>
-        <p:txBody>
-          <a:bodyPr rtlCol="0" anchor="ctr"/>
-          <a:lstStyle/>
-          <a:p>
-            <a:pPr algn="ctr"/>
-            <a:r>
-              <a:rPr lang="en-US" dirty="0"/>
-              <a:t>Buttons</a:t>
-            </a:r>
-          </a:p>
-        </p:txBody>
-      </p:sp>
-      <p:sp>
-        <p:nvSpPr>
-          <p:cNvPr id="9" name="Rounded Rectangle 8">
-            <a:extLst>
-              <a:ext uri="{FF2B5EF4-FFF2-40B4-BE49-F238E27FC236}">
-                <a16:creationId xmlns:a16="http://schemas.microsoft.com/office/drawing/2014/main" id="{D19F8923-6F3A-2481-714E-E2C256C60A96}"/>
-              </a:ext>
-            </a:extLst>
-          </p:cNvPr>
-          <p:cNvSpPr/>
-          <p:nvPr/>
-        </p:nvSpPr>
-        <p:spPr>
-          <a:xfrm>
-            <a:off x="7647014" y="2628900"/>
-            <a:ext cx="1678895" cy="858636"/>
-          </a:xfrm>
-          <a:prstGeom prst="roundRect">
-            <a:avLst/>
-          </a:prstGeom>
-        </p:spPr>
-        <p:style>
-          <a:lnRef idx="2">
-            <a:schemeClr val="accent1">
-              <a:shade val="15000"/>
-            </a:schemeClr>
-          </a:lnRef>
-          <a:fillRef idx="1">
-            <a:schemeClr val="accent1"/>
-          </a:fillRef>
-          <a:effectRef idx="0">
-            <a:schemeClr val="accent1"/>
-          </a:effectRef>
-          <a:fontRef idx="minor">
-            <a:schemeClr val="lt1"/>
-          </a:fontRef>
-        </p:style>
-        <p:txBody>
-          <a:bodyPr rtlCol="0" anchor="ctr"/>
-          <a:lstStyle/>
-          <a:p>
-            <a:pPr algn="ctr"/>
-            <a:r>
-              <a:rPr lang="en-US" dirty="0"/>
-              <a:t>Slide Power Switch</a:t>
-            </a:r>
-          </a:p>
-          <a:p>
-            <a:pPr algn="ctr"/>
-            <a:r>
-              <a:rPr lang="en-US" dirty="0"/>
-              <a:t>COM-00102</a:t>
+              <a:t>ILI9341</a:t>
             </a:r>
           </a:p>
         </p:txBody>
@@ -16051,96 +15950,13 @@
           </p:cNvPr>
           <p:cNvCxnSpPr>
             <a:cxnSpLocks/>
-            <a:stCxn id="6" idx="3"/>
           </p:cNvCxnSpPr>
           <p:nvPr/>
         </p:nvCxnSpPr>
         <p:spPr>
           <a:xfrm>
-            <a:off x="2089265" y="2628900"/>
+            <a:off x="3317125" y="2628900"/>
             <a:ext cx="950075" cy="0"/>
-          </a:xfrm>
-          <a:prstGeom prst="straightConnector1">
-            <a:avLst/>
-          </a:prstGeom>
-          <a:ln w="38100">
-            <a:tailEnd type="triangle"/>
-          </a:ln>
-        </p:spPr>
-        <p:style>
-          <a:lnRef idx="3">
-            <a:schemeClr val="accent1"/>
-          </a:lnRef>
-          <a:fillRef idx="0">
-            <a:schemeClr val="accent1"/>
-          </a:fillRef>
-          <a:effectRef idx="2">
-            <a:schemeClr val="accent1"/>
-          </a:effectRef>
-          <a:fontRef idx="minor">
-            <a:schemeClr val="tx1"/>
-          </a:fontRef>
-        </p:style>
-      </p:cxnSp>
-      <p:cxnSp>
-        <p:nvCxnSpPr>
-          <p:cNvPr id="12" name="Straight Arrow Connector 11">
-            <a:extLst>
-              <a:ext uri="{FF2B5EF4-FFF2-40B4-BE49-F238E27FC236}">
-                <a16:creationId xmlns:a16="http://schemas.microsoft.com/office/drawing/2014/main" id="{CB48E45A-69C7-C1D0-75E2-FC913844C920}"/>
-              </a:ext>
-            </a:extLst>
-          </p:cNvPr>
-          <p:cNvCxnSpPr>
-            <a:cxnSpLocks/>
-          </p:cNvCxnSpPr>
-          <p:nvPr/>
-        </p:nvCxnSpPr>
-        <p:spPr>
-          <a:xfrm flipH="1">
-            <a:off x="6696940" y="3048000"/>
-            <a:ext cx="950976" cy="0"/>
-          </a:xfrm>
-          <a:prstGeom prst="straightConnector1">
-            <a:avLst/>
-          </a:prstGeom>
-          <a:ln w="38100">
-            <a:tailEnd type="triangle"/>
-          </a:ln>
-        </p:spPr>
-        <p:style>
-          <a:lnRef idx="3">
-            <a:schemeClr val="accent1"/>
-          </a:lnRef>
-          <a:fillRef idx="0">
-            <a:schemeClr val="accent1"/>
-          </a:fillRef>
-          <a:effectRef idx="2">
-            <a:schemeClr val="accent1"/>
-          </a:effectRef>
-          <a:fontRef idx="minor">
-            <a:schemeClr val="tx1"/>
-          </a:fontRef>
-        </p:style>
-      </p:cxnSp>
-      <p:cxnSp>
-        <p:nvCxnSpPr>
-          <p:cNvPr id="14" name="Straight Arrow Connector 13">
-            <a:extLst>
-              <a:ext uri="{FF2B5EF4-FFF2-40B4-BE49-F238E27FC236}">
-                <a16:creationId xmlns:a16="http://schemas.microsoft.com/office/drawing/2014/main" id="{39D8D1FA-C1EF-1878-EC6F-BDCB9A15C158}"/>
-              </a:ext>
-            </a:extLst>
-          </p:cNvPr>
-          <p:cNvCxnSpPr>
-            <a:cxnSpLocks/>
-          </p:cNvCxnSpPr>
-          <p:nvPr/>
-        </p:nvCxnSpPr>
-        <p:spPr>
-          <a:xfrm flipH="1">
-            <a:off x="6696039" y="4016779"/>
-            <a:ext cx="950976" cy="0"/>
           </a:xfrm>
           <a:prstGeom prst="straightConnector1">
             <a:avLst/>
@@ -16180,7 +15996,7 @@
         </p:nvCxnSpPr>
         <p:spPr>
           <a:xfrm flipH="1">
-            <a:off x="6696039" y="4888922"/>
+            <a:off x="7923899" y="4888922"/>
             <a:ext cx="950976" cy="0"/>
           </a:xfrm>
           <a:prstGeom prst="straightConnector1">
@@ -16207,10 +16023,10 @@
       </p:cxnSp>
       <p:sp>
         <p:nvSpPr>
-          <p:cNvPr id="16" name="TextBox 15">
+          <p:cNvPr id="17" name="TextBox 16">
             <a:extLst>
               <a:ext uri="{FF2B5EF4-FFF2-40B4-BE49-F238E27FC236}">
-                <a16:creationId xmlns:a16="http://schemas.microsoft.com/office/drawing/2014/main" id="{70E70073-45EE-3BA8-F2B8-600ADFAAF3F5}"/>
+                <a16:creationId xmlns:a16="http://schemas.microsoft.com/office/drawing/2014/main" id="{3879DE32-31EB-853A-AF9B-48FC55432C1F}"/>
               </a:ext>
             </a:extLst>
           </p:cNvPr>
@@ -16219,8 +16035,8 @@
         </p:nvSpPr>
         <p:spPr>
           <a:xfrm>
-            <a:off x="3086100" y="2438400"/>
-            <a:ext cx="1104900" cy="369332"/>
+            <a:off x="4230482" y="4231089"/>
+            <a:ext cx="2190843" cy="923330"/>
           </a:xfrm>
           <a:prstGeom prst="rect">
             <a:avLst/>
@@ -16239,85 +16055,7 @@
                   <a:schemeClr val="bg1"/>
                 </a:solidFill>
               </a:rPr>
-              <a:t>PWM</a:t>
-            </a:r>
-          </a:p>
-        </p:txBody>
-      </p:sp>
-      <p:sp>
-        <p:nvSpPr>
-          <p:cNvPr id="17" name="TextBox 16">
-            <a:extLst>
-              <a:ext uri="{FF2B5EF4-FFF2-40B4-BE49-F238E27FC236}">
-                <a16:creationId xmlns:a16="http://schemas.microsoft.com/office/drawing/2014/main" id="{3879DE32-31EB-853A-AF9B-48FC55432C1F}"/>
-              </a:ext>
-            </a:extLst>
-          </p:cNvPr>
-          <p:cNvSpPr txBox="1"/>
-          <p:nvPr/>
-        </p:nvSpPr>
-        <p:spPr>
-          <a:xfrm>
-            <a:off x="5609566" y="2857500"/>
-            <a:ext cx="1104900" cy="369332"/>
-          </a:xfrm>
-          <a:prstGeom prst="rect">
-            <a:avLst/>
-          </a:prstGeom>
-          <a:noFill/>
-        </p:spPr>
-        <p:txBody>
-          <a:bodyPr wrap="square" rtlCol="0">
-            <a:spAutoFit/>
-          </a:bodyPr>
-          <a:lstStyle/>
-          <a:p>
-            <a:r>
-              <a:rPr lang="en-US" dirty="0">
-                <a:solidFill>
-                  <a:schemeClr val="bg1"/>
-                </a:solidFill>
-              </a:rPr>
-              <a:t>1 GPIO?</a:t>
-            </a:r>
-          </a:p>
-        </p:txBody>
-      </p:sp>
-      <p:sp>
-        <p:nvSpPr>
-          <p:cNvPr id="18" name="TextBox 17">
-            <a:extLst>
-              <a:ext uri="{FF2B5EF4-FFF2-40B4-BE49-F238E27FC236}">
-                <a16:creationId xmlns:a16="http://schemas.microsoft.com/office/drawing/2014/main" id="{C62DC5AA-7455-6F01-1CA1-789A1807A776}"/>
-              </a:ext>
-            </a:extLst>
-          </p:cNvPr>
-          <p:cNvSpPr txBox="1"/>
-          <p:nvPr/>
-        </p:nvSpPr>
-        <p:spPr>
-          <a:xfrm>
-            <a:off x="5621412" y="3841280"/>
-            <a:ext cx="1104900" cy="369332"/>
-          </a:xfrm>
-          <a:prstGeom prst="rect">
-            <a:avLst/>
-          </a:prstGeom>
-          <a:noFill/>
-        </p:spPr>
-        <p:txBody>
-          <a:bodyPr wrap="square" rtlCol="0">
-            <a:spAutoFit/>
-          </a:bodyPr>
-          <a:lstStyle/>
-          <a:p>
-            <a:r>
-              <a:rPr lang="en-US" dirty="0">
-                <a:solidFill>
-                  <a:schemeClr val="bg1"/>
-                </a:solidFill>
-              </a:rPr>
-              <a:t>5 GPIOs</a:t>
+              <a:t>5 GPIO.IN (P1.26, P1.28, P1.30, P1.32, P1.34)</a:t>
             </a:r>
           </a:p>
         </p:txBody>
@@ -16336,7 +16074,7 @@
         </p:nvSpPr>
         <p:spPr>
           <a:xfrm>
-            <a:off x="5623456" y="4674632"/>
+            <a:off x="6845579" y="4704256"/>
             <a:ext cx="1104900" cy="369332"/>
           </a:xfrm>
           <a:prstGeom prst="rect">
@@ -16350,13 +16088,14 @@
           </a:bodyPr>
           <a:lstStyle/>
           <a:p>
+            <a:pPr algn="r"/>
             <a:r>
               <a:rPr lang="en-US" dirty="0">
                 <a:solidFill>
                   <a:schemeClr val="bg1"/>
                 </a:solidFill>
               </a:rPr>
-              <a:t>5 GPIOs</a:t>
+              <a:t>SPI1</a:t>
             </a:r>
           </a:p>
         </p:txBody>
@@ -16375,7 +16114,7 @@
         </p:nvSpPr>
         <p:spPr>
           <a:xfrm>
-            <a:off x="4024745" y="3453884"/>
+            <a:off x="5252605" y="3453884"/>
             <a:ext cx="1686790" cy="369332"/>
           </a:xfrm>
           <a:prstGeom prst="rect">
@@ -16402,6 +16141,488 @@
                 <a:schemeClr val="bg1"/>
               </a:solidFill>
             </a:endParaRPr>
+          </a:p>
+        </p:txBody>
+      </p:sp>
+      <p:sp>
+        <p:nvSpPr>
+          <p:cNvPr id="13" name="TextBox 12">
+            <a:extLst>
+              <a:ext uri="{FF2B5EF4-FFF2-40B4-BE49-F238E27FC236}">
+                <a16:creationId xmlns:a16="http://schemas.microsoft.com/office/drawing/2014/main" id="{128D6398-F222-C615-7E3D-E242CDBB9D64}"/>
+              </a:ext>
+            </a:extLst>
+          </p:cNvPr>
+          <p:cNvSpPr txBox="1"/>
+          <p:nvPr/>
+        </p:nvSpPr>
+        <p:spPr>
+          <a:xfrm>
+            <a:off x="4267199" y="2444234"/>
+            <a:ext cx="1104900" cy="369332"/>
+          </a:xfrm>
+          <a:prstGeom prst="rect">
+            <a:avLst/>
+          </a:prstGeom>
+          <a:noFill/>
+        </p:spPr>
+        <p:txBody>
+          <a:bodyPr wrap="square" rtlCol="0">
+            <a:spAutoFit/>
+          </a:bodyPr>
+          <a:lstStyle/>
+          <a:p>
+            <a:r>
+              <a:rPr lang="en-US" dirty="0">
+                <a:solidFill>
+                  <a:schemeClr val="bg1"/>
+                </a:solidFill>
+              </a:rPr>
+              <a:t>USB1</a:t>
+            </a:r>
+          </a:p>
+        </p:txBody>
+      </p:sp>
+      <p:sp>
+        <p:nvSpPr>
+          <p:cNvPr id="20" name="Rounded Rectangle 19">
+            <a:extLst>
+              <a:ext uri="{FF2B5EF4-FFF2-40B4-BE49-F238E27FC236}">
+                <a16:creationId xmlns:a16="http://schemas.microsoft.com/office/drawing/2014/main" id="{F906CAD3-B379-C326-769E-DBA5EC0953A3}"/>
+              </a:ext>
+            </a:extLst>
+          </p:cNvPr>
+          <p:cNvSpPr/>
+          <p:nvPr/>
+        </p:nvSpPr>
+        <p:spPr>
+          <a:xfrm>
+            <a:off x="8874875" y="1823519"/>
+            <a:ext cx="1897034" cy="924962"/>
+          </a:xfrm>
+          <a:prstGeom prst="roundRect">
+            <a:avLst/>
+          </a:prstGeom>
+        </p:spPr>
+        <p:style>
+          <a:lnRef idx="2">
+            <a:schemeClr val="accent1">
+              <a:shade val="15000"/>
+            </a:schemeClr>
+          </a:lnRef>
+          <a:fillRef idx="1">
+            <a:schemeClr val="accent1"/>
+          </a:fillRef>
+          <a:effectRef idx="0">
+            <a:schemeClr val="accent1"/>
+          </a:effectRef>
+          <a:fontRef idx="minor">
+            <a:schemeClr val="lt1"/>
+          </a:fontRef>
+        </p:style>
+        <p:txBody>
+          <a:bodyPr rtlCol="0" anchor="ctr"/>
+          <a:lstStyle/>
+          <a:p>
+            <a:pPr algn="ctr"/>
+            <a:r>
+              <a:rPr lang="en-US" dirty="0"/>
+              <a:t>Buzzer </a:t>
+            </a:r>
+          </a:p>
+          <a:p>
+            <a:pPr algn="ctr"/>
+            <a:r>
+              <a:rPr lang="en-US" dirty="0"/>
+              <a:t>Product ID: 1536</a:t>
+            </a:r>
+          </a:p>
+        </p:txBody>
+      </p:sp>
+      <p:cxnSp>
+        <p:nvCxnSpPr>
+          <p:cNvPr id="22" name="Straight Arrow Connector 21">
+            <a:extLst>
+              <a:ext uri="{FF2B5EF4-FFF2-40B4-BE49-F238E27FC236}">
+                <a16:creationId xmlns:a16="http://schemas.microsoft.com/office/drawing/2014/main" id="{D2C22604-111E-B468-E84A-664B244B5BBA}"/>
+              </a:ext>
+            </a:extLst>
+          </p:cNvPr>
+          <p:cNvCxnSpPr>
+            <a:cxnSpLocks/>
+          </p:cNvCxnSpPr>
+          <p:nvPr/>
+        </p:nvCxnSpPr>
+        <p:spPr>
+          <a:xfrm>
+            <a:off x="3317124" y="4692754"/>
+            <a:ext cx="950075" cy="0"/>
+          </a:xfrm>
+          <a:prstGeom prst="straightConnector1">
+            <a:avLst/>
+          </a:prstGeom>
+          <a:ln w="38100">
+            <a:tailEnd type="triangle"/>
+          </a:ln>
+        </p:spPr>
+        <p:style>
+          <a:lnRef idx="3">
+            <a:schemeClr val="accent1"/>
+          </a:lnRef>
+          <a:fillRef idx="0">
+            <a:schemeClr val="accent1"/>
+          </a:fillRef>
+          <a:effectRef idx="2">
+            <a:schemeClr val="accent1"/>
+          </a:effectRef>
+          <a:fontRef idx="minor">
+            <a:schemeClr val="tx1"/>
+          </a:fontRef>
+        </p:style>
+      </p:cxnSp>
+      <p:sp>
+        <p:nvSpPr>
+          <p:cNvPr id="3" name="TextBox 2">
+            <a:extLst>
+              <a:ext uri="{FF2B5EF4-FFF2-40B4-BE49-F238E27FC236}">
+                <a16:creationId xmlns:a16="http://schemas.microsoft.com/office/drawing/2014/main" id="{71BCB542-22B2-2DAF-7A5F-032A183BF3E9}"/>
+              </a:ext>
+            </a:extLst>
+          </p:cNvPr>
+          <p:cNvSpPr txBox="1"/>
+          <p:nvPr/>
+        </p:nvSpPr>
+        <p:spPr>
+          <a:xfrm>
+            <a:off x="6879197" y="3453245"/>
+            <a:ext cx="1104900" cy="369332"/>
+          </a:xfrm>
+          <a:prstGeom prst="rect">
+            <a:avLst/>
+          </a:prstGeom>
+          <a:noFill/>
+        </p:spPr>
+        <p:txBody>
+          <a:bodyPr wrap="square" rtlCol="0">
+            <a:spAutoFit/>
+          </a:bodyPr>
+          <a:lstStyle/>
+          <a:p>
+            <a:pPr algn="r"/>
+            <a:r>
+              <a:rPr lang="en-US" dirty="0">
+                <a:solidFill>
+                  <a:schemeClr val="bg1"/>
+                </a:solidFill>
+              </a:rPr>
+              <a:t>I2C1</a:t>
+            </a:r>
+          </a:p>
+        </p:txBody>
+      </p:sp>
+      <p:cxnSp>
+        <p:nvCxnSpPr>
+          <p:cNvPr id="4" name="Straight Arrow Connector 3">
+            <a:extLst>
+              <a:ext uri="{FF2B5EF4-FFF2-40B4-BE49-F238E27FC236}">
+                <a16:creationId xmlns:a16="http://schemas.microsoft.com/office/drawing/2014/main" id="{917BF372-E16D-E347-1001-D5002B8E1655}"/>
+              </a:ext>
+            </a:extLst>
+          </p:cNvPr>
+          <p:cNvCxnSpPr>
+            <a:cxnSpLocks/>
+          </p:cNvCxnSpPr>
+          <p:nvPr/>
+        </p:nvCxnSpPr>
+        <p:spPr>
+          <a:xfrm flipH="1">
+            <a:off x="7923899" y="3619500"/>
+            <a:ext cx="950976" cy="0"/>
+          </a:xfrm>
+          <a:prstGeom prst="straightConnector1">
+            <a:avLst/>
+          </a:prstGeom>
+          <a:ln w="38100">
+            <a:tailEnd type="triangle"/>
+          </a:ln>
+        </p:spPr>
+        <p:style>
+          <a:lnRef idx="3">
+            <a:schemeClr val="accent1"/>
+          </a:lnRef>
+          <a:fillRef idx="0">
+            <a:schemeClr val="accent1"/>
+          </a:fillRef>
+          <a:effectRef idx="2">
+            <a:schemeClr val="accent1"/>
+          </a:effectRef>
+          <a:fontRef idx="minor">
+            <a:schemeClr val="tx1"/>
+          </a:fontRef>
+        </p:style>
+      </p:cxnSp>
+      <p:sp>
+        <p:nvSpPr>
+          <p:cNvPr id="7" name="Rounded Rectangle 6">
+            <a:extLst>
+              <a:ext uri="{FF2B5EF4-FFF2-40B4-BE49-F238E27FC236}">
+                <a16:creationId xmlns:a16="http://schemas.microsoft.com/office/drawing/2014/main" id="{163CC179-FC9A-67A9-D9CA-45EBC7C76DB2}"/>
+              </a:ext>
+            </a:extLst>
+          </p:cNvPr>
+          <p:cNvSpPr/>
+          <p:nvPr/>
+        </p:nvSpPr>
+        <p:spPr>
+          <a:xfrm>
+            <a:off x="8885266" y="2926318"/>
+            <a:ext cx="1897033" cy="1378982"/>
+          </a:xfrm>
+          <a:prstGeom prst="roundRect">
+            <a:avLst/>
+          </a:prstGeom>
+        </p:spPr>
+        <p:style>
+          <a:lnRef idx="2">
+            <a:schemeClr val="accent1">
+              <a:shade val="15000"/>
+            </a:schemeClr>
+          </a:lnRef>
+          <a:fillRef idx="1">
+            <a:schemeClr val="accent1"/>
+          </a:fillRef>
+          <a:effectRef idx="0">
+            <a:schemeClr val="accent1"/>
+          </a:effectRef>
+          <a:fontRef idx="minor">
+            <a:schemeClr val="lt1"/>
+          </a:fontRef>
+        </p:style>
+        <p:txBody>
+          <a:bodyPr rtlCol="0" anchor="ctr"/>
+          <a:lstStyle/>
+          <a:p>
+            <a:pPr algn="ctr"/>
+            <a:r>
+              <a:rPr lang="en-US" dirty="0"/>
+              <a:t>Resistive Touch Screen Controller</a:t>
+            </a:r>
+            <a:endParaRPr lang="en-US" dirty="0">
+              <a:solidFill>
+                <a:srgbClr val="000000"/>
+              </a:solidFill>
+              <a:latin typeface="proxima nova"/>
+            </a:endParaRPr>
+          </a:p>
+          <a:p>
+            <a:pPr algn="ctr"/>
+            <a:r>
+              <a:rPr lang="en-US" dirty="0">
+                <a:solidFill>
+                  <a:schemeClr val="bg1"/>
+                </a:solidFill>
+                <a:latin typeface="proxima nova"/>
+              </a:rPr>
+              <a:t>Product ID: 5423</a:t>
+            </a:r>
+            <a:endParaRPr lang="en-US" dirty="0">
+              <a:solidFill>
+                <a:schemeClr val="bg1"/>
+              </a:solidFill>
+            </a:endParaRPr>
+          </a:p>
+        </p:txBody>
+      </p:sp>
+      <p:cxnSp>
+        <p:nvCxnSpPr>
+          <p:cNvPr id="9" name="Straight Arrow Connector 8">
+            <a:extLst>
+              <a:ext uri="{FF2B5EF4-FFF2-40B4-BE49-F238E27FC236}">
+                <a16:creationId xmlns:a16="http://schemas.microsoft.com/office/drawing/2014/main" id="{3180EC1D-30E5-E641-DCC8-912F53F02DAC}"/>
+              </a:ext>
+            </a:extLst>
+          </p:cNvPr>
+          <p:cNvCxnSpPr>
+            <a:cxnSpLocks/>
+          </p:cNvCxnSpPr>
+          <p:nvPr/>
+        </p:nvCxnSpPr>
+        <p:spPr>
+          <a:xfrm flipH="1">
+            <a:off x="7923898" y="2324100"/>
+            <a:ext cx="950976" cy="0"/>
+          </a:xfrm>
+          <a:prstGeom prst="straightConnector1">
+            <a:avLst/>
+          </a:prstGeom>
+          <a:ln w="38100">
+            <a:tailEnd type="triangle"/>
+          </a:ln>
+        </p:spPr>
+        <p:style>
+          <a:lnRef idx="3">
+            <a:schemeClr val="accent1"/>
+          </a:lnRef>
+          <a:fillRef idx="0">
+            <a:schemeClr val="accent1"/>
+          </a:fillRef>
+          <a:effectRef idx="2">
+            <a:schemeClr val="accent1"/>
+          </a:effectRef>
+          <a:fontRef idx="minor">
+            <a:schemeClr val="tx1"/>
+          </a:fontRef>
+        </p:style>
+      </p:cxnSp>
+      <p:sp>
+        <p:nvSpPr>
+          <p:cNvPr id="10" name="TextBox 9">
+            <a:extLst>
+              <a:ext uri="{FF2B5EF4-FFF2-40B4-BE49-F238E27FC236}">
+                <a16:creationId xmlns:a16="http://schemas.microsoft.com/office/drawing/2014/main" id="{F64632C3-FCE6-74D7-ED47-B18703867CBA}"/>
+              </a:ext>
+            </a:extLst>
+          </p:cNvPr>
+          <p:cNvSpPr txBox="1"/>
+          <p:nvPr/>
+        </p:nvSpPr>
+        <p:spPr>
+          <a:xfrm>
+            <a:off x="6818997" y="2139434"/>
+            <a:ext cx="1104900" cy="369332"/>
+          </a:xfrm>
+          <a:prstGeom prst="rect">
+            <a:avLst/>
+          </a:prstGeom>
+          <a:noFill/>
+        </p:spPr>
+        <p:txBody>
+          <a:bodyPr wrap="square" rtlCol="0">
+            <a:spAutoFit/>
+          </a:bodyPr>
+          <a:lstStyle/>
+          <a:p>
+            <a:pPr algn="r"/>
+            <a:r>
+              <a:rPr lang="en-US" dirty="0">
+                <a:solidFill>
+                  <a:schemeClr val="bg1"/>
+                </a:solidFill>
+              </a:rPr>
+              <a:t>PWM1A</a:t>
+            </a:r>
+          </a:p>
+        </p:txBody>
+      </p:sp>
+      <p:sp>
+        <p:nvSpPr>
+          <p:cNvPr id="14" name="Rounded Rectangle 13">
+            <a:extLst>
+              <a:ext uri="{FF2B5EF4-FFF2-40B4-BE49-F238E27FC236}">
+                <a16:creationId xmlns:a16="http://schemas.microsoft.com/office/drawing/2014/main" id="{2638FB91-B85A-1706-D9A8-56C5FE9A2012}"/>
+              </a:ext>
+            </a:extLst>
+          </p:cNvPr>
+          <p:cNvSpPr/>
+          <p:nvPr/>
+        </p:nvSpPr>
+        <p:spPr>
+          <a:xfrm>
+            <a:off x="1490228" y="4221554"/>
+            <a:ext cx="1900672" cy="864156"/>
+          </a:xfrm>
+          <a:prstGeom prst="roundRect">
+            <a:avLst/>
+          </a:prstGeom>
+        </p:spPr>
+        <p:style>
+          <a:lnRef idx="2">
+            <a:schemeClr val="accent1">
+              <a:shade val="15000"/>
+            </a:schemeClr>
+          </a:lnRef>
+          <a:fillRef idx="1">
+            <a:schemeClr val="accent1"/>
+          </a:fillRef>
+          <a:effectRef idx="0">
+            <a:schemeClr val="accent1"/>
+          </a:effectRef>
+          <a:fontRef idx="minor">
+            <a:schemeClr val="lt1"/>
+          </a:fontRef>
+        </p:style>
+        <p:txBody>
+          <a:bodyPr rtlCol="0" anchor="ctr"/>
+          <a:lstStyle/>
+          <a:p>
+            <a:pPr algn="ctr"/>
+            <a:r>
+              <a:rPr lang="en-US" dirty="0"/>
+              <a:t>Arcade Buttons</a:t>
+            </a:r>
+          </a:p>
+          <a:p>
+            <a:pPr algn="ctr"/>
+            <a:r>
+              <a:rPr lang="en-US" dirty="0"/>
+              <a:t>ASIN: B01N11BDX9</a:t>
+            </a:r>
+          </a:p>
+        </p:txBody>
+      </p:sp>
+      <p:sp>
+        <p:nvSpPr>
+          <p:cNvPr id="18" name="Rounded Rectangle 17">
+            <a:extLst>
+              <a:ext uri="{FF2B5EF4-FFF2-40B4-BE49-F238E27FC236}">
+                <a16:creationId xmlns:a16="http://schemas.microsoft.com/office/drawing/2014/main" id="{978F3755-DBC5-BC92-8E55-C0A9185F857D}"/>
+              </a:ext>
+            </a:extLst>
+          </p:cNvPr>
+          <p:cNvSpPr/>
+          <p:nvPr/>
+        </p:nvSpPr>
+        <p:spPr>
+          <a:xfrm>
+            <a:off x="1490228" y="2264950"/>
+            <a:ext cx="1900672" cy="727900"/>
+          </a:xfrm>
+          <a:prstGeom prst="roundRect">
+            <a:avLst/>
+          </a:prstGeom>
+        </p:spPr>
+        <p:style>
+          <a:lnRef idx="2">
+            <a:schemeClr val="accent1">
+              <a:shade val="15000"/>
+            </a:schemeClr>
+          </a:lnRef>
+          <a:fillRef idx="1">
+            <a:schemeClr val="accent1"/>
+          </a:fillRef>
+          <a:effectRef idx="0">
+            <a:schemeClr val="accent1"/>
+          </a:effectRef>
+          <a:fontRef idx="minor">
+            <a:schemeClr val="lt1"/>
+          </a:fontRef>
+        </p:style>
+        <p:txBody>
+          <a:bodyPr rtlCol="0" anchor="ctr"/>
+          <a:lstStyle/>
+          <a:p>
+            <a:pPr algn="ctr"/>
+            <a:r>
+              <a:rPr lang="en-US" dirty="0"/>
+              <a:t>USB Speaker</a:t>
+            </a:r>
+          </a:p>
+          <a:p>
+            <a:pPr algn="ctr"/>
+            <a:r>
+              <a:rPr lang="en-US" dirty="0"/>
+              <a:t>LLR050A</a:t>
+            </a:r>
           </a:p>
         </p:txBody>
       </p:sp>
@@ -16477,10 +16698,10 @@
       </p:sp>
       <p:sp>
         <p:nvSpPr>
-          <p:cNvPr id="5" name="Rounded Rectangle 4">
+          <p:cNvPr id="3" name="Rounded Rectangle 2">
             <a:extLst>
               <a:ext uri="{FF2B5EF4-FFF2-40B4-BE49-F238E27FC236}">
-                <a16:creationId xmlns:a16="http://schemas.microsoft.com/office/drawing/2014/main" id="{F2F2B8EA-BA87-F918-9F2C-1AEFCF87333F}"/>
+                <a16:creationId xmlns:a16="http://schemas.microsoft.com/office/drawing/2014/main" id="{9BFD8864-4E8C-D8FB-A86E-CE35DD8105CC}"/>
               </a:ext>
             </a:extLst>
           </p:cNvPr>
@@ -16489,7 +16710,7 @@
         </p:nvSpPr>
         <p:spPr>
           <a:xfrm>
-            <a:off x="4038600" y="1869057"/>
+            <a:off x="4267200" y="1638300"/>
             <a:ext cx="3657600" cy="4000500"/>
           </a:xfrm>
           <a:prstGeom prst="roundRect">
@@ -16523,10 +16744,10 @@
       </p:sp>
       <p:sp>
         <p:nvSpPr>
-          <p:cNvPr id="6" name="Rounded Rectangle 5">
+          <p:cNvPr id="4" name="Rounded Rectangle 3">
             <a:extLst>
               <a:ext uri="{FF2B5EF4-FFF2-40B4-BE49-F238E27FC236}">
-                <a16:creationId xmlns:a16="http://schemas.microsoft.com/office/drawing/2014/main" id="{C42FEDB8-1F1C-F408-8471-EB10CFFB3766}"/>
+                <a16:creationId xmlns:a16="http://schemas.microsoft.com/office/drawing/2014/main" id="{BEE2F2CA-04D8-FCE3-1EEB-C72AB85A5A3C}"/>
               </a:ext>
             </a:extLst>
           </p:cNvPr>
@@ -16535,8 +16756,8 @@
         </p:nvSpPr>
         <p:spPr>
           <a:xfrm>
-            <a:off x="508499" y="2547702"/>
-            <a:ext cx="1728214" cy="685800"/>
+            <a:off x="10017875" y="4423740"/>
+            <a:ext cx="1907425" cy="924962"/>
           </a:xfrm>
           <a:prstGeom prst="roundRect">
             <a:avLst/>
@@ -16565,192 +16786,36 @@
             <a:pPr algn="ctr"/>
             <a:r>
               <a:rPr lang="en-US" dirty="0"/>
-              <a:t>Speaker</a:t>
+              <a:t>LCD Touchscreen</a:t>
             </a:r>
           </a:p>
           <a:p>
             <a:pPr algn="ctr"/>
             <a:r>
               <a:rPr lang="en-US" dirty="0"/>
-              <a:t>PRT-20660</a:t>
-            </a:r>
-          </a:p>
-        </p:txBody>
-      </p:sp>
-      <p:sp>
-        <p:nvSpPr>
-          <p:cNvPr id="7" name="Rounded Rectangle 6">
-            <a:extLst>
-              <a:ext uri="{FF2B5EF4-FFF2-40B4-BE49-F238E27FC236}">
-                <a16:creationId xmlns:a16="http://schemas.microsoft.com/office/drawing/2014/main" id="{CB0FCC5D-0C68-25C5-C62A-FD3E8E0F8894}"/>
-              </a:ext>
-            </a:extLst>
-          </p:cNvPr>
-          <p:cNvSpPr/>
-          <p:nvPr/>
-        </p:nvSpPr>
-        <p:spPr>
-          <a:xfrm>
-            <a:off x="9571760" y="3926457"/>
-            <a:ext cx="1660468" cy="685800"/>
-          </a:xfrm>
-          <a:prstGeom prst="roundRect">
-            <a:avLst/>
-          </a:prstGeom>
-        </p:spPr>
-        <p:style>
-          <a:lnRef idx="2">
-            <a:schemeClr val="accent1">
-              <a:shade val="15000"/>
-            </a:schemeClr>
-          </a:lnRef>
-          <a:fillRef idx="1">
-            <a:schemeClr val="accent1"/>
-          </a:fillRef>
-          <a:effectRef idx="0">
-            <a:schemeClr val="accent1"/>
-          </a:effectRef>
-          <a:fontRef idx="minor">
-            <a:schemeClr val="lt1"/>
-          </a:fontRef>
-        </p:style>
-        <p:txBody>
-          <a:bodyPr rtlCol="0" anchor="ctr"/>
-          <a:lstStyle/>
-          <a:p>
-            <a:pPr algn="ctr"/>
-            <a:r>
-              <a:rPr lang="en-US" dirty="0"/>
-              <a:t>LEDs</a:t>
-            </a:r>
-          </a:p>
-        </p:txBody>
-      </p:sp>
-      <p:sp>
-        <p:nvSpPr>
-          <p:cNvPr id="8" name="Rounded Rectangle 7">
-            <a:extLst>
-              <a:ext uri="{FF2B5EF4-FFF2-40B4-BE49-F238E27FC236}">
-                <a16:creationId xmlns:a16="http://schemas.microsoft.com/office/drawing/2014/main" id="{6F4C9950-36C4-1DFA-43BE-0F0941183841}"/>
-              </a:ext>
-            </a:extLst>
-          </p:cNvPr>
-          <p:cNvSpPr/>
-          <p:nvPr/>
-        </p:nvSpPr>
-        <p:spPr>
-          <a:xfrm>
-            <a:off x="9571761" y="4776779"/>
-            <a:ext cx="1678894" cy="685800"/>
-          </a:xfrm>
-          <a:prstGeom prst="roundRect">
-            <a:avLst/>
-          </a:prstGeom>
-        </p:spPr>
-        <p:style>
-          <a:lnRef idx="2">
-            <a:schemeClr val="accent1">
-              <a:shade val="15000"/>
-            </a:schemeClr>
-          </a:lnRef>
-          <a:fillRef idx="1">
-            <a:schemeClr val="accent1"/>
-          </a:fillRef>
-          <a:effectRef idx="0">
-            <a:schemeClr val="accent1"/>
-          </a:effectRef>
-          <a:fontRef idx="minor">
-            <a:schemeClr val="lt1"/>
-          </a:fontRef>
-        </p:style>
-        <p:txBody>
-          <a:bodyPr rtlCol="0" anchor="ctr"/>
-          <a:lstStyle/>
-          <a:p>
-            <a:pPr algn="ctr"/>
-            <a:r>
-              <a:rPr lang="en-US" dirty="0"/>
-              <a:t>Buttons</a:t>
-            </a:r>
-          </a:p>
-        </p:txBody>
-      </p:sp>
-      <p:sp>
-        <p:nvSpPr>
-          <p:cNvPr id="9" name="Rounded Rectangle 8">
-            <a:extLst>
-              <a:ext uri="{FF2B5EF4-FFF2-40B4-BE49-F238E27FC236}">
-                <a16:creationId xmlns:a16="http://schemas.microsoft.com/office/drawing/2014/main" id="{D19F8923-6F3A-2481-714E-E2C256C60A96}"/>
-              </a:ext>
-            </a:extLst>
-          </p:cNvPr>
-          <p:cNvSpPr/>
-          <p:nvPr/>
-        </p:nvSpPr>
-        <p:spPr>
-          <a:xfrm>
-            <a:off x="9571760" y="2704551"/>
-            <a:ext cx="1678895" cy="955206"/>
-          </a:xfrm>
-          <a:prstGeom prst="roundRect">
-            <a:avLst/>
-          </a:prstGeom>
-        </p:spPr>
-        <p:style>
-          <a:lnRef idx="2">
-            <a:schemeClr val="accent1">
-              <a:shade val="15000"/>
-            </a:schemeClr>
-          </a:lnRef>
-          <a:fillRef idx="1">
-            <a:schemeClr val="accent1"/>
-          </a:fillRef>
-          <a:effectRef idx="0">
-            <a:schemeClr val="accent1"/>
-          </a:effectRef>
-          <a:fontRef idx="minor">
-            <a:schemeClr val="lt1"/>
-          </a:fontRef>
-        </p:style>
-        <p:txBody>
-          <a:bodyPr rtlCol="0" anchor="ctr"/>
-          <a:lstStyle/>
-          <a:p>
-            <a:pPr algn="ctr"/>
-            <a:r>
-              <a:rPr lang="en-US" dirty="0"/>
-              <a:t>Slide Power Switch</a:t>
-            </a:r>
-          </a:p>
-          <a:p>
-            <a:pPr algn="ctr"/>
-            <a:r>
-              <a:rPr lang="en-US" dirty="0"/>
-              <a:t>COM-00102</a:t>
+              <a:t>ILI9341</a:t>
             </a:r>
           </a:p>
         </p:txBody>
       </p:sp>
       <p:cxnSp>
         <p:nvCxnSpPr>
-          <p:cNvPr id="11" name="Straight Arrow Connector 10">
+          <p:cNvPr id="5" name="Straight Arrow Connector 4">
             <a:extLst>
               <a:ext uri="{FF2B5EF4-FFF2-40B4-BE49-F238E27FC236}">
-                <a16:creationId xmlns:a16="http://schemas.microsoft.com/office/drawing/2014/main" id="{B75A7EFC-FBC2-49A7-0D28-E2BDF9EA38C2}"/>
+                <a16:creationId xmlns:a16="http://schemas.microsoft.com/office/drawing/2014/main" id="{97E4403F-EC41-3625-C00F-8C24D61B2A07}"/>
               </a:ext>
             </a:extLst>
           </p:cNvPr>
           <p:cNvCxnSpPr>
             <a:cxnSpLocks/>
-            <a:stCxn id="16" idx="1"/>
-            <a:endCxn id="6" idx="3"/>
           </p:cNvCxnSpPr>
           <p:nvPr/>
         </p:nvCxnSpPr>
         <p:spPr>
-          <a:xfrm flipH="1">
-            <a:off x="2236713" y="2890602"/>
-            <a:ext cx="1801887" cy="0"/>
+          <a:xfrm>
+            <a:off x="7914755" y="4868903"/>
+            <a:ext cx="2103120" cy="0"/>
           </a:xfrm>
           <a:prstGeom prst="straightConnector1">
             <a:avLst/>
@@ -16776,23 +16841,22 @@
       </p:cxnSp>
       <p:cxnSp>
         <p:nvCxnSpPr>
-          <p:cNvPr id="14" name="Straight Arrow Connector 13">
+          <p:cNvPr id="6" name="Straight Arrow Connector 5">
             <a:extLst>
               <a:ext uri="{FF2B5EF4-FFF2-40B4-BE49-F238E27FC236}">
-                <a16:creationId xmlns:a16="http://schemas.microsoft.com/office/drawing/2014/main" id="{39D8D1FA-C1EF-1878-EC6F-BDCB9A15C158}"/>
+                <a16:creationId xmlns:a16="http://schemas.microsoft.com/office/drawing/2014/main" id="{CD8F26E2-4525-AA50-1D32-6CF1A1C0BE0C}"/>
               </a:ext>
             </a:extLst>
           </p:cNvPr>
           <p:cNvCxnSpPr>
             <a:cxnSpLocks/>
-            <a:endCxn id="7" idx="1"/>
           </p:cNvCxnSpPr>
           <p:nvPr/>
         </p:nvCxnSpPr>
         <p:spPr>
-          <a:xfrm>
-            <a:off x="7725572" y="4256703"/>
-            <a:ext cx="1846188" cy="0"/>
+          <a:xfrm flipH="1">
+            <a:off x="2164079" y="2628900"/>
+            <a:ext cx="2103120" cy="0"/>
           </a:xfrm>
           <a:prstGeom prst="straightConnector1">
             <a:avLst/>
@@ -16818,10 +16882,10 @@
       </p:cxnSp>
       <p:sp>
         <p:nvSpPr>
-          <p:cNvPr id="16" name="TextBox 15">
+          <p:cNvPr id="7" name="TextBox 6">
             <a:extLst>
               <a:ext uri="{FF2B5EF4-FFF2-40B4-BE49-F238E27FC236}">
-                <a16:creationId xmlns:a16="http://schemas.microsoft.com/office/drawing/2014/main" id="{70E70073-45EE-3BA8-F2B8-600ADFAAF3F5}"/>
+                <a16:creationId xmlns:a16="http://schemas.microsoft.com/office/drawing/2014/main" id="{B2E49B3D-8D87-42B1-CB3E-3E1D39D912F3}"/>
               </a:ext>
             </a:extLst>
           </p:cNvPr>
@@ -16830,8 +16894,8 @@
         </p:nvSpPr>
         <p:spPr>
           <a:xfrm>
-            <a:off x="4038600" y="2705936"/>
-            <a:ext cx="1104900" cy="369332"/>
+            <a:off x="4230482" y="4231089"/>
+            <a:ext cx="2190843" cy="923330"/>
           </a:xfrm>
           <a:prstGeom prst="rect">
             <a:avLst/>
@@ -16850,17 +16914,17 @@
                   <a:schemeClr val="bg1"/>
                 </a:solidFill>
               </a:rPr>
-              <a:t>PWM</a:t>
+              <a:t>5 GPIO.IN (P1.26, P1.28, P1.30, P1.32, P1.34)</a:t>
             </a:r>
           </a:p>
         </p:txBody>
       </p:sp>
       <p:sp>
         <p:nvSpPr>
-          <p:cNvPr id="17" name="TextBox 16">
+          <p:cNvPr id="8" name="TextBox 7">
             <a:extLst>
               <a:ext uri="{FF2B5EF4-FFF2-40B4-BE49-F238E27FC236}">
-                <a16:creationId xmlns:a16="http://schemas.microsoft.com/office/drawing/2014/main" id="{3879DE32-31EB-853A-AF9B-48FC55432C1F}"/>
+                <a16:creationId xmlns:a16="http://schemas.microsoft.com/office/drawing/2014/main" id="{68618F3B-EAC4-D72E-5FB7-137189DB6243}"/>
               </a:ext>
             </a:extLst>
           </p:cNvPr>
@@ -16869,8 +16933,8 @@
         </p:nvSpPr>
         <p:spPr>
           <a:xfrm>
-            <a:off x="6591969" y="3009900"/>
-            <a:ext cx="1341491" cy="369332"/>
+            <a:off x="6845579" y="4704256"/>
+            <a:ext cx="1104900" cy="369332"/>
           </a:xfrm>
           <a:prstGeom prst="rect">
             <a:avLst/>
@@ -16883,23 +16947,24 @@
           </a:bodyPr>
           <a:lstStyle/>
           <a:p>
+            <a:pPr algn="r"/>
             <a:r>
               <a:rPr lang="en-US" dirty="0">
                 <a:solidFill>
                   <a:schemeClr val="bg1"/>
                 </a:solidFill>
               </a:rPr>
-              <a:t>GPIO_IN</a:t>
+              <a:t>SPI1</a:t>
             </a:r>
           </a:p>
         </p:txBody>
       </p:sp>
       <p:sp>
         <p:nvSpPr>
-          <p:cNvPr id="21" name="TextBox 20">
+          <p:cNvPr id="9" name="TextBox 8">
             <a:extLst>
               <a:ext uri="{FF2B5EF4-FFF2-40B4-BE49-F238E27FC236}">
-                <a16:creationId xmlns:a16="http://schemas.microsoft.com/office/drawing/2014/main" id="{0658B8CC-B503-6297-0BB5-D9000100D8DC}"/>
+                <a16:creationId xmlns:a16="http://schemas.microsoft.com/office/drawing/2014/main" id="{152CA10A-6866-487B-6139-E5B4A9C9A8D6}"/>
               </a:ext>
             </a:extLst>
           </p:cNvPr>
@@ -16908,7 +16973,7 @@
         </p:nvSpPr>
         <p:spPr>
           <a:xfrm>
-            <a:off x="5024005" y="3684641"/>
+            <a:off x="5252605" y="3453884"/>
             <a:ext cx="1686790" cy="369332"/>
           </a:xfrm>
           <a:prstGeom prst="rect">
@@ -16940,10 +17005,10 @@
       </p:sp>
       <p:sp>
         <p:nvSpPr>
-          <p:cNvPr id="29" name="TextBox 28">
+          <p:cNvPr id="11" name="TextBox 10">
             <a:extLst>
               <a:ext uri="{FF2B5EF4-FFF2-40B4-BE49-F238E27FC236}">
-                <a16:creationId xmlns:a16="http://schemas.microsoft.com/office/drawing/2014/main" id="{8F6E4265-9C2F-C28C-171E-C01824B57B58}"/>
+                <a16:creationId xmlns:a16="http://schemas.microsoft.com/office/drawing/2014/main" id="{3AFF09EB-A268-3EAB-6FD2-71E3068790AE}"/>
               </a:ext>
             </a:extLst>
           </p:cNvPr>
@@ -16952,8 +17017,8 @@
         </p:nvSpPr>
         <p:spPr>
           <a:xfrm>
-            <a:off x="7802086" y="3926457"/>
-            <a:ext cx="1743872" cy="646331"/>
+            <a:off x="4267199" y="2444234"/>
+            <a:ext cx="1104900" cy="369332"/>
           </a:xfrm>
           <a:prstGeom prst="rect">
             <a:avLst/>
@@ -16967,18 +17032,118 @@
           <a:lstStyle/>
           <a:p>
             <a:r>
+              <a:rPr lang="en-US" dirty="0">
+                <a:solidFill>
+                  <a:schemeClr val="bg1"/>
+                </a:solidFill>
+              </a:rPr>
+              <a:t>USB1</a:t>
+            </a:r>
+          </a:p>
+        </p:txBody>
+      </p:sp>
+      <p:sp>
+        <p:nvSpPr>
+          <p:cNvPr id="14" name="Rounded Rectangle 13">
+            <a:extLst>
+              <a:ext uri="{FF2B5EF4-FFF2-40B4-BE49-F238E27FC236}">
+                <a16:creationId xmlns:a16="http://schemas.microsoft.com/office/drawing/2014/main" id="{451BFE80-F237-C470-FFF8-A8894E5A3394}"/>
+              </a:ext>
+            </a:extLst>
+          </p:cNvPr>
+          <p:cNvSpPr/>
+          <p:nvPr/>
+        </p:nvSpPr>
+        <p:spPr>
+          <a:xfrm>
+            <a:off x="10028266" y="1835642"/>
+            <a:ext cx="1897034" cy="924962"/>
+          </a:xfrm>
+          <a:prstGeom prst="roundRect">
+            <a:avLst/>
+          </a:prstGeom>
+        </p:spPr>
+        <p:style>
+          <a:lnRef idx="2">
+            <a:schemeClr val="accent1">
+              <a:shade val="15000"/>
+            </a:schemeClr>
+          </a:lnRef>
+          <a:fillRef idx="1">
+            <a:schemeClr val="accent1"/>
+          </a:fillRef>
+          <a:effectRef idx="0">
+            <a:schemeClr val="accent1"/>
+          </a:effectRef>
+          <a:fontRef idx="minor">
+            <a:schemeClr val="lt1"/>
+          </a:fontRef>
+        </p:style>
+        <p:txBody>
+          <a:bodyPr rtlCol="0" anchor="ctr"/>
+          <a:lstStyle/>
+          <a:p>
+            <a:pPr algn="ctr"/>
+            <a:r>
               <a:rPr lang="en-US" dirty="0"/>
-              <a:t>3.3 V, max current 20 mA</a:t>
+              <a:t>Buzzer </a:t>
+            </a:r>
+          </a:p>
+          <a:p>
+            <a:pPr algn="ctr"/>
+            <a:r>
+              <a:rPr lang="en-US" dirty="0"/>
+              <a:t>Product ID: 1536</a:t>
+            </a:r>
+          </a:p>
+        </p:txBody>
+      </p:sp>
+      <p:sp>
+        <p:nvSpPr>
+          <p:cNvPr id="16" name="TextBox 15">
+            <a:extLst>
+              <a:ext uri="{FF2B5EF4-FFF2-40B4-BE49-F238E27FC236}">
+                <a16:creationId xmlns:a16="http://schemas.microsoft.com/office/drawing/2014/main" id="{33255D99-620F-4946-C24F-A7AAF1421429}"/>
+              </a:ext>
+            </a:extLst>
+          </p:cNvPr>
+          <p:cNvSpPr txBox="1"/>
+          <p:nvPr/>
+        </p:nvSpPr>
+        <p:spPr>
+          <a:xfrm>
+            <a:off x="6879197" y="3453245"/>
+            <a:ext cx="1104900" cy="369332"/>
+          </a:xfrm>
+          <a:prstGeom prst="rect">
+            <a:avLst/>
+          </a:prstGeom>
+          <a:noFill/>
+        </p:spPr>
+        <p:txBody>
+          <a:bodyPr wrap="square" rtlCol="0">
+            <a:spAutoFit/>
+          </a:bodyPr>
+          <a:lstStyle/>
+          <a:p>
+            <a:pPr algn="r"/>
+            <a:r>
+              <a:rPr lang="en-US" dirty="0">
+                <a:solidFill>
+                  <a:schemeClr val="bg1"/>
+                </a:solidFill>
+              </a:rPr>
+              <a:t>I2C1</a:t>
             </a:r>
           </a:p>
         </p:txBody>
       </p:sp>
       <p:cxnSp>
         <p:nvCxnSpPr>
-          <p:cNvPr id="30" name="Straight Arrow Connector 29">
+          <p:cNvPr id="17" name="Straight Arrow Connector 16">
             <a:extLst>
               <a:ext uri="{FF2B5EF4-FFF2-40B4-BE49-F238E27FC236}">
-                <a16:creationId xmlns:a16="http://schemas.microsoft.com/office/drawing/2014/main" id="{CDDD6753-3626-EECC-9224-B31909FBBEB6}"/>
+                <a16:creationId xmlns:a16="http://schemas.microsoft.com/office/drawing/2014/main" id="{23EDBAF7-0C97-5749-C195-03BA794E63B7}"/>
               </a:ext>
             </a:extLst>
           </p:cNvPr>
@@ -16988,9 +17153,9 @@
           <p:nvPr/>
         </p:nvCxnSpPr>
         <p:spPr>
-          <a:xfrm flipH="1" flipV="1">
-            <a:off x="7724672" y="5101841"/>
-            <a:ext cx="1847088" cy="0"/>
+          <a:xfrm flipH="1">
+            <a:off x="7923899" y="3619500"/>
+            <a:ext cx="2103120" cy="0"/>
           </a:xfrm>
           <a:prstGeom prst="straightConnector1">
             <a:avLst/>
@@ -17016,10 +17181,82 @@
       </p:cxnSp>
       <p:sp>
         <p:nvSpPr>
-          <p:cNvPr id="31" name="TextBox 30">
+          <p:cNvPr id="18" name="Rounded Rectangle 17">
             <a:extLst>
               <a:ext uri="{FF2B5EF4-FFF2-40B4-BE49-F238E27FC236}">
-                <a16:creationId xmlns:a16="http://schemas.microsoft.com/office/drawing/2014/main" id="{64599335-BF0D-E35B-D540-320F73218049}"/>
+                <a16:creationId xmlns:a16="http://schemas.microsoft.com/office/drawing/2014/main" id="{FE5EE368-4612-74BB-13CC-3BCEF9A84C6E}"/>
+              </a:ext>
+            </a:extLst>
+          </p:cNvPr>
+          <p:cNvSpPr/>
+          <p:nvPr/>
+        </p:nvSpPr>
+        <p:spPr>
+          <a:xfrm>
+            <a:off x="10028267" y="2902681"/>
+            <a:ext cx="1897033" cy="1378982"/>
+          </a:xfrm>
+          <a:prstGeom prst="roundRect">
+            <a:avLst/>
+          </a:prstGeom>
+        </p:spPr>
+        <p:style>
+          <a:lnRef idx="2">
+            <a:schemeClr val="accent1">
+              <a:shade val="15000"/>
+            </a:schemeClr>
+          </a:lnRef>
+          <a:fillRef idx="1">
+            <a:schemeClr val="accent1"/>
+          </a:fillRef>
+          <a:effectRef idx="0">
+            <a:schemeClr val="accent1"/>
+          </a:effectRef>
+          <a:fontRef idx="minor">
+            <a:schemeClr val="lt1"/>
+          </a:fontRef>
+        </p:style>
+        <p:txBody>
+          <a:bodyPr rtlCol="0" anchor="ctr"/>
+          <a:lstStyle/>
+          <a:p>
+            <a:pPr algn="ctr"/>
+            <a:r>
+              <a:rPr lang="en-US" dirty="0"/>
+              <a:t>Resistive Touch Screen Controller</a:t>
+            </a:r>
+            <a:endParaRPr lang="en-US" dirty="0">
+              <a:solidFill>
+                <a:srgbClr val="000000"/>
+              </a:solidFill>
+              <a:latin typeface="proxima nova"/>
+            </a:endParaRPr>
+          </a:p>
+          <a:p>
+            <a:pPr algn="ctr"/>
+            <a:r>
+              <a:rPr lang="en-US" dirty="0">
+                <a:solidFill>
+                  <a:schemeClr val="bg1"/>
+                </a:solidFill>
+                <a:latin typeface="proxima nova"/>
+              </a:rPr>
+              <a:t>Product ID: 5423</a:t>
+            </a:r>
+            <a:endParaRPr lang="en-US" dirty="0">
+              <a:solidFill>
+                <a:schemeClr val="bg1"/>
+              </a:solidFill>
+            </a:endParaRPr>
+          </a:p>
+        </p:txBody>
+      </p:sp>
+      <p:sp>
+        <p:nvSpPr>
+          <p:cNvPr id="21" name="TextBox 20">
+            <a:extLst>
+              <a:ext uri="{FF2B5EF4-FFF2-40B4-BE49-F238E27FC236}">
+                <a16:creationId xmlns:a16="http://schemas.microsoft.com/office/drawing/2014/main" id="{D55EB0DA-2066-5ABC-9BAA-D778695A14D6}"/>
               </a:ext>
             </a:extLst>
           </p:cNvPr>
@@ -17028,8 +17265,160 @@
         </p:nvSpPr>
         <p:spPr>
           <a:xfrm>
-            <a:off x="7861209" y="4776779"/>
-            <a:ext cx="1786794" cy="646331"/>
+            <a:off x="6818997" y="2139434"/>
+            <a:ext cx="1104900" cy="369332"/>
+          </a:xfrm>
+          <a:prstGeom prst="rect">
+            <a:avLst/>
+          </a:prstGeom>
+          <a:noFill/>
+        </p:spPr>
+        <p:txBody>
+          <a:bodyPr wrap="square" rtlCol="0">
+            <a:spAutoFit/>
+          </a:bodyPr>
+          <a:lstStyle/>
+          <a:p>
+            <a:pPr algn="r"/>
+            <a:r>
+              <a:rPr lang="en-US" dirty="0">
+                <a:solidFill>
+                  <a:schemeClr val="bg1"/>
+                </a:solidFill>
+              </a:rPr>
+              <a:t>PWM1A</a:t>
+            </a:r>
+          </a:p>
+        </p:txBody>
+      </p:sp>
+      <p:sp>
+        <p:nvSpPr>
+          <p:cNvPr id="27" name="Rounded Rectangle 26">
+            <a:extLst>
+              <a:ext uri="{FF2B5EF4-FFF2-40B4-BE49-F238E27FC236}">
+                <a16:creationId xmlns:a16="http://schemas.microsoft.com/office/drawing/2014/main" id="{8E1E3058-6B8F-BC94-EA11-E5E9DC9847AF}"/>
+              </a:ext>
+            </a:extLst>
+          </p:cNvPr>
+          <p:cNvSpPr/>
+          <p:nvPr/>
+        </p:nvSpPr>
+        <p:spPr>
+          <a:xfrm>
+            <a:off x="271028" y="4279344"/>
+            <a:ext cx="1900672" cy="864156"/>
+          </a:xfrm>
+          <a:prstGeom prst="roundRect">
+            <a:avLst/>
+          </a:prstGeom>
+        </p:spPr>
+        <p:style>
+          <a:lnRef idx="2">
+            <a:schemeClr val="accent1">
+              <a:shade val="15000"/>
+            </a:schemeClr>
+          </a:lnRef>
+          <a:fillRef idx="1">
+            <a:schemeClr val="accent1"/>
+          </a:fillRef>
+          <a:effectRef idx="0">
+            <a:schemeClr val="accent1"/>
+          </a:effectRef>
+          <a:fontRef idx="minor">
+            <a:schemeClr val="lt1"/>
+          </a:fontRef>
+        </p:style>
+        <p:txBody>
+          <a:bodyPr rtlCol="0" anchor="ctr"/>
+          <a:lstStyle/>
+          <a:p>
+            <a:pPr algn="ctr"/>
+            <a:r>
+              <a:rPr lang="en-US" dirty="0"/>
+              <a:t>Arcade Buttons</a:t>
+            </a:r>
+          </a:p>
+          <a:p>
+            <a:pPr algn="ctr"/>
+            <a:r>
+              <a:rPr lang="en-US" dirty="0"/>
+              <a:t>ASIN: B01N11BDX9</a:t>
+            </a:r>
+          </a:p>
+        </p:txBody>
+      </p:sp>
+      <p:sp>
+        <p:nvSpPr>
+          <p:cNvPr id="29" name="Rounded Rectangle 28">
+            <a:extLst>
+              <a:ext uri="{FF2B5EF4-FFF2-40B4-BE49-F238E27FC236}">
+                <a16:creationId xmlns:a16="http://schemas.microsoft.com/office/drawing/2014/main" id="{25A0C181-3881-A4A5-9891-BC1F1FFBCF4D}"/>
+              </a:ext>
+            </a:extLst>
+          </p:cNvPr>
+          <p:cNvSpPr/>
+          <p:nvPr/>
+        </p:nvSpPr>
+        <p:spPr>
+          <a:xfrm>
+            <a:off x="271028" y="2243900"/>
+            <a:ext cx="1900672" cy="727900"/>
+          </a:xfrm>
+          <a:prstGeom prst="roundRect">
+            <a:avLst/>
+          </a:prstGeom>
+        </p:spPr>
+        <p:style>
+          <a:lnRef idx="2">
+            <a:schemeClr val="accent1">
+              <a:shade val="15000"/>
+            </a:schemeClr>
+          </a:lnRef>
+          <a:fillRef idx="1">
+            <a:schemeClr val="accent1"/>
+          </a:fillRef>
+          <a:effectRef idx="0">
+            <a:schemeClr val="accent1"/>
+          </a:effectRef>
+          <a:fontRef idx="minor">
+            <a:schemeClr val="lt1"/>
+          </a:fontRef>
+        </p:style>
+        <p:txBody>
+          <a:bodyPr rtlCol="0" anchor="ctr"/>
+          <a:lstStyle/>
+          <a:p>
+            <a:pPr algn="ctr"/>
+            <a:r>
+              <a:rPr lang="en-US" dirty="0"/>
+              <a:t>USB Speaker</a:t>
+            </a:r>
+          </a:p>
+          <a:p>
+            <a:pPr algn="ctr"/>
+            <a:r>
+              <a:rPr lang="en-US" dirty="0"/>
+              <a:t>LLR050A</a:t>
+            </a:r>
+          </a:p>
+        </p:txBody>
+      </p:sp>
+      <p:sp>
+        <p:nvSpPr>
+          <p:cNvPr id="31" name="TextBox 30">
+            <a:extLst>
+              <a:ext uri="{FF2B5EF4-FFF2-40B4-BE49-F238E27FC236}">
+                <a16:creationId xmlns:a16="http://schemas.microsoft.com/office/drawing/2014/main" id="{F22822BC-FD32-A6DD-A44E-88A525A1451C}"/>
+              </a:ext>
+            </a:extLst>
+          </p:cNvPr>
+          <p:cNvSpPr txBox="1"/>
+          <p:nvPr/>
+        </p:nvSpPr>
+        <p:spPr>
+          <a:xfrm>
+            <a:off x="2225736" y="2315170"/>
+            <a:ext cx="1943100" cy="923330"/>
           </a:xfrm>
           <a:prstGeom prst="rect">
             <a:avLst/>
@@ -17044,7 +17433,15 @@
           <a:p>
             <a:r>
               <a:rPr lang="en-US" dirty="0"/>
-              <a:t>3.3 V, max current 100 mA</a:t>
+              <a:t>5V (not from </a:t>
+            </a:r>
+            <a:r>
+              <a:rPr lang="en-US" dirty="0" err="1"/>
+              <a:t>PocketBeagle</a:t>
+            </a:r>
+            <a:r>
+              <a:rPr lang="en-US" dirty="0"/>
+              <a:t>), current unknown</a:t>
             </a:r>
           </a:p>
         </p:txBody>
@@ -17054,7 +17451,7 @@
           <p:cNvPr id="32" name="TextBox 31">
             <a:extLst>
               <a:ext uri="{FF2B5EF4-FFF2-40B4-BE49-F238E27FC236}">
-                <a16:creationId xmlns:a16="http://schemas.microsoft.com/office/drawing/2014/main" id="{0C919A14-DD26-56C0-7722-70280F696566}"/>
+                <a16:creationId xmlns:a16="http://schemas.microsoft.com/office/drawing/2014/main" id="{6CDB5CB9-4D8E-E53F-A816-F317CF6189F2}"/>
               </a:ext>
             </a:extLst>
           </p:cNvPr>
@@ -17063,8 +17460,8 @@
         </p:nvSpPr>
         <p:spPr>
           <a:xfrm>
-            <a:off x="7818286" y="2857500"/>
-            <a:ext cx="1829717" cy="646331"/>
+            <a:off x="2264005" y="4362634"/>
+            <a:ext cx="1943100" cy="369332"/>
           </a:xfrm>
           <a:prstGeom prst="rect">
             <a:avLst/>
@@ -17079,17 +17476,162 @@
           <a:p>
             <a:r>
               <a:rPr lang="en-US" dirty="0"/>
-              <a:t>3.3 V, max current 200 mA</a:t>
+              <a:t>5V, 5-10 mA</a:t>
+            </a:r>
+          </a:p>
+        </p:txBody>
+      </p:sp>
+      <p:sp>
+        <p:nvSpPr>
+          <p:cNvPr id="33" name="TextBox 32">
+            <a:extLst>
+              <a:ext uri="{FF2B5EF4-FFF2-40B4-BE49-F238E27FC236}">
+                <a16:creationId xmlns:a16="http://schemas.microsoft.com/office/drawing/2014/main" id="{CEF102D5-1FB8-931C-464F-85F6191BBF9A}"/>
+              </a:ext>
+            </a:extLst>
+          </p:cNvPr>
+          <p:cNvSpPr txBox="1"/>
+          <p:nvPr/>
+        </p:nvSpPr>
+        <p:spPr>
+          <a:xfrm>
+            <a:off x="7961518" y="1991775"/>
+            <a:ext cx="1943100" cy="369332"/>
+          </a:xfrm>
+          <a:prstGeom prst="rect">
+            <a:avLst/>
+          </a:prstGeom>
+          <a:noFill/>
+        </p:spPr>
+        <p:txBody>
+          <a:bodyPr wrap="square" rtlCol="0">
+            <a:spAutoFit/>
+          </a:bodyPr>
+          <a:lstStyle/>
+          <a:p>
+            <a:r>
+              <a:rPr lang="en-US" dirty="0"/>
+              <a:t>3.3 V, max 5 mA</a:t>
+            </a:r>
+          </a:p>
+        </p:txBody>
+      </p:sp>
+      <p:sp>
+        <p:nvSpPr>
+          <p:cNvPr id="34" name="TextBox 33">
+            <a:extLst>
+              <a:ext uri="{FF2B5EF4-FFF2-40B4-BE49-F238E27FC236}">
+                <a16:creationId xmlns:a16="http://schemas.microsoft.com/office/drawing/2014/main" id="{A9A37091-1740-9714-01BC-9474FD21A184}"/>
+              </a:ext>
+            </a:extLst>
+          </p:cNvPr>
+          <p:cNvSpPr txBox="1"/>
+          <p:nvPr/>
+        </p:nvSpPr>
+        <p:spPr>
+          <a:xfrm>
+            <a:off x="8004047" y="3268579"/>
+            <a:ext cx="2003022" cy="369332"/>
+          </a:xfrm>
+          <a:prstGeom prst="rect">
+            <a:avLst/>
+          </a:prstGeom>
+          <a:noFill/>
+        </p:spPr>
+        <p:txBody>
+          <a:bodyPr wrap="square" rtlCol="0">
+            <a:spAutoFit/>
+          </a:bodyPr>
+          <a:lstStyle/>
+          <a:p>
+            <a:r>
+              <a:rPr lang="en-US" dirty="0"/>
+              <a:t>3.3 V, max 50 mA</a:t>
+            </a:r>
+          </a:p>
+        </p:txBody>
+      </p:sp>
+      <p:sp>
+        <p:nvSpPr>
+          <p:cNvPr id="35" name="TextBox 34">
+            <a:extLst>
+              <a:ext uri="{FF2B5EF4-FFF2-40B4-BE49-F238E27FC236}">
+                <a16:creationId xmlns:a16="http://schemas.microsoft.com/office/drawing/2014/main" id="{D3F98969-A884-F0AC-25F8-967F6BC3F191}"/>
+              </a:ext>
+            </a:extLst>
+          </p:cNvPr>
+          <p:cNvSpPr txBox="1"/>
+          <p:nvPr/>
+        </p:nvSpPr>
+        <p:spPr>
+          <a:xfrm>
+            <a:off x="7910751" y="4516889"/>
+            <a:ext cx="2107124" cy="369332"/>
+          </a:xfrm>
+          <a:prstGeom prst="rect">
+            <a:avLst/>
+          </a:prstGeom>
+          <a:noFill/>
+        </p:spPr>
+        <p:txBody>
+          <a:bodyPr wrap="square" rtlCol="0">
+            <a:spAutoFit/>
+          </a:bodyPr>
+          <a:lstStyle/>
+          <a:p>
+            <a:r>
+              <a:rPr lang="en-US" dirty="0"/>
+              <a:t>3.3 V, max 150 mA</a:t>
             </a:r>
           </a:p>
         </p:txBody>
       </p:sp>
       <p:cxnSp>
         <p:nvCxnSpPr>
-          <p:cNvPr id="33" name="Straight Arrow Connector 32">
+          <p:cNvPr id="37" name="Straight Arrow Connector 36">
             <a:extLst>
               <a:ext uri="{FF2B5EF4-FFF2-40B4-BE49-F238E27FC236}">
-                <a16:creationId xmlns:a16="http://schemas.microsoft.com/office/drawing/2014/main" id="{2ADE2004-D9A1-AF0E-D7C6-85AE958B70C2}"/>
+                <a16:creationId xmlns:a16="http://schemas.microsoft.com/office/drawing/2014/main" id="{3BEEA766-967D-E91A-7D31-6249A4529C1D}"/>
+              </a:ext>
+            </a:extLst>
+          </p:cNvPr>
+          <p:cNvCxnSpPr/>
+          <p:nvPr/>
+        </p:nvCxnSpPr>
+        <p:spPr>
+          <a:xfrm>
+            <a:off x="2171700" y="4704256"/>
+            <a:ext cx="2103120" cy="0"/>
+          </a:xfrm>
+          <a:prstGeom prst="straightConnector1">
+            <a:avLst/>
+          </a:prstGeom>
+          <a:ln w="38100">
+            <a:headEnd type="triangle"/>
+            <a:tailEnd type="triangle"/>
+          </a:ln>
+        </p:spPr>
+        <p:style>
+          <a:lnRef idx="1">
+            <a:schemeClr val="accent1"/>
+          </a:lnRef>
+          <a:fillRef idx="0">
+            <a:schemeClr val="accent1"/>
+          </a:fillRef>
+          <a:effectRef idx="0">
+            <a:schemeClr val="accent1"/>
+          </a:effectRef>
+          <a:fontRef idx="minor">
+            <a:schemeClr val="tx1"/>
+          </a:fontRef>
+        </p:style>
+      </p:cxnSp>
+      <p:cxnSp>
+        <p:nvCxnSpPr>
+          <p:cNvPr id="38" name="Straight Arrow Connector 37">
+            <a:extLst>
+              <a:ext uri="{FF2B5EF4-FFF2-40B4-BE49-F238E27FC236}">
+                <a16:creationId xmlns:a16="http://schemas.microsoft.com/office/drawing/2014/main" id="{75497869-BF1E-DAC4-C0FA-2D61EEBAB26D}"/>
               </a:ext>
             </a:extLst>
           </p:cNvPr>
@@ -17099,9 +17641,9 @@
           <p:nvPr/>
         </p:nvCxnSpPr>
         <p:spPr>
-          <a:xfrm flipH="1">
-            <a:off x="7696200" y="3180666"/>
-            <a:ext cx="1847088" cy="3842"/>
+          <a:xfrm>
+            <a:off x="7923899" y="2324100"/>
+            <a:ext cx="2103120" cy="0"/>
           </a:xfrm>
           <a:prstGeom prst="straightConnector1">
             <a:avLst/>
@@ -17125,179 +17667,6 @@
           </a:fontRef>
         </p:style>
       </p:cxnSp>
-      <p:sp>
-        <p:nvSpPr>
-          <p:cNvPr id="34" name="Content Placeholder 2">
-            <a:extLst>
-              <a:ext uri="{FF2B5EF4-FFF2-40B4-BE49-F238E27FC236}">
-                <a16:creationId xmlns:a16="http://schemas.microsoft.com/office/drawing/2014/main" id="{8E5A63DC-12CA-4BFE-5097-DD0EFF6004F9}"/>
-              </a:ext>
-            </a:extLst>
-          </p:cNvPr>
-          <p:cNvSpPr>
-            <a:spLocks noGrp="1"/>
-          </p:cNvSpPr>
-          <p:nvPr>
-            <p:ph idx="1"/>
-          </p:nvPr>
-        </p:nvSpPr>
-        <p:spPr>
-          <a:xfrm>
-            <a:off x="7505700" y="180060"/>
-            <a:ext cx="4533899" cy="2184847"/>
-          </a:xfrm>
-        </p:spPr>
-        <p:txBody>
-          <a:bodyPr>
-            <a:normAutofit lnSpcReduction="10000"/>
-          </a:bodyPr>
-          <a:lstStyle/>
-          <a:p>
-            <a:r>
-              <a:rPr lang="en-US" dirty="0"/>
-              <a:t>Questions</a:t>
-            </a:r>
-          </a:p>
-          <a:p>
-            <a:pPr lvl="1"/>
-            <a:r>
-              <a:rPr lang="en-US" dirty="0"/>
-              <a:t>When do you use SYS 3.3 V power versus GPIO? </a:t>
-            </a:r>
-          </a:p>
-          <a:p>
-            <a:pPr lvl="1"/>
-            <a:r>
-              <a:rPr lang="en-US" dirty="0"/>
-              <a:t>Can you back calculate current from a power rating and voltage?</a:t>
-            </a:r>
-          </a:p>
-          <a:p>
-            <a:pPr lvl="1"/>
-            <a:r>
-              <a:rPr lang="en-US" dirty="0"/>
-              <a:t>Are the arrows directed the correct way (especially for the buttons)? </a:t>
-            </a:r>
-          </a:p>
-          <a:p>
-            <a:pPr lvl="1"/>
-            <a:endParaRPr lang="en-US" dirty="0"/>
-          </a:p>
-        </p:txBody>
-      </p:sp>
-      <p:sp>
-        <p:nvSpPr>
-          <p:cNvPr id="37" name="TextBox 36">
-            <a:extLst>
-              <a:ext uri="{FF2B5EF4-FFF2-40B4-BE49-F238E27FC236}">
-                <a16:creationId xmlns:a16="http://schemas.microsoft.com/office/drawing/2014/main" id="{75CE0480-5378-4E4F-7E35-009BA0BEB9D0}"/>
-              </a:ext>
-            </a:extLst>
-          </p:cNvPr>
-          <p:cNvSpPr txBox="1"/>
-          <p:nvPr/>
-        </p:nvSpPr>
-        <p:spPr>
-          <a:xfrm>
-            <a:off x="6621743" y="4039209"/>
-            <a:ext cx="1341491" cy="369332"/>
-          </a:xfrm>
-          <a:prstGeom prst="rect">
-            <a:avLst/>
-          </a:prstGeom>
-          <a:noFill/>
-        </p:spPr>
-        <p:txBody>
-          <a:bodyPr wrap="square" rtlCol="0">
-            <a:spAutoFit/>
-          </a:bodyPr>
-          <a:lstStyle/>
-          <a:p>
-            <a:r>
-              <a:rPr lang="en-US" dirty="0">
-                <a:solidFill>
-                  <a:schemeClr val="bg1"/>
-                </a:solidFill>
-              </a:rPr>
-              <a:t>GPIO_IN</a:t>
-            </a:r>
-          </a:p>
-        </p:txBody>
-      </p:sp>
-      <p:sp>
-        <p:nvSpPr>
-          <p:cNvPr id="38" name="TextBox 37">
-            <a:extLst>
-              <a:ext uri="{FF2B5EF4-FFF2-40B4-BE49-F238E27FC236}">
-                <a16:creationId xmlns:a16="http://schemas.microsoft.com/office/drawing/2014/main" id="{E1D3825C-6DEE-936F-7BF2-EDF957F4F36E}"/>
-              </a:ext>
-            </a:extLst>
-          </p:cNvPr>
-          <p:cNvSpPr txBox="1"/>
-          <p:nvPr/>
-        </p:nvSpPr>
-        <p:spPr>
-          <a:xfrm>
-            <a:off x="6621743" y="4921003"/>
-            <a:ext cx="1341491" cy="369332"/>
-          </a:xfrm>
-          <a:prstGeom prst="rect">
-            <a:avLst/>
-          </a:prstGeom>
-          <a:noFill/>
-        </p:spPr>
-        <p:txBody>
-          <a:bodyPr wrap="square" rtlCol="0">
-            <a:spAutoFit/>
-          </a:bodyPr>
-          <a:lstStyle/>
-          <a:p>
-            <a:r>
-              <a:rPr lang="en-US" dirty="0">
-                <a:solidFill>
-                  <a:schemeClr val="bg1"/>
-                </a:solidFill>
-              </a:rPr>
-              <a:t>GPIO_IN</a:t>
-            </a:r>
-          </a:p>
-        </p:txBody>
-      </p:sp>
-      <p:sp>
-        <p:nvSpPr>
-          <p:cNvPr id="40" name="TextBox 39">
-            <a:extLst>
-              <a:ext uri="{FF2B5EF4-FFF2-40B4-BE49-F238E27FC236}">
-                <a16:creationId xmlns:a16="http://schemas.microsoft.com/office/drawing/2014/main" id="{74D48F8E-26D7-B121-0368-4A3CE98280A0}"/>
-              </a:ext>
-            </a:extLst>
-          </p:cNvPr>
-          <p:cNvSpPr txBox="1"/>
-          <p:nvPr/>
-        </p:nvSpPr>
-        <p:spPr>
-          <a:xfrm>
-            <a:off x="2358799" y="2552700"/>
-            <a:ext cx="1829717" cy="646331"/>
-          </a:xfrm>
-          <a:prstGeom prst="rect">
-            <a:avLst/>
-          </a:prstGeom>
-          <a:noFill/>
-        </p:spPr>
-        <p:txBody>
-          <a:bodyPr wrap="square" rtlCol="0">
-            <a:spAutoFit/>
-          </a:bodyPr>
-          <a:lstStyle/>
-          <a:p>
-            <a:r>
-              <a:rPr lang="en-US" dirty="0"/>
-              <a:t>3.3 V, max current 151 mA</a:t>
-            </a:r>
-          </a:p>
-        </p:txBody>
-      </p:sp>
     </p:spTree>
     <p:extLst>
       <p:ext uri="{BB962C8B-B14F-4D97-AF65-F5344CB8AC3E}">
@@ -17384,14 +17753,14 @@
             <p:ph idx="1"/>
             <p:extLst>
               <p:ext uri="{D42A27DB-BD31-4B8C-83A1-F6EECF244321}">
-                <p14:modId xmlns:p14="http://schemas.microsoft.com/office/powerpoint/2010/main" val="1700474716"/>
+                <p14:modId xmlns:p14="http://schemas.microsoft.com/office/powerpoint/2010/main" val="3833910334"/>
               </p:ext>
             </p:extLst>
           </p:nvPr>
         </p:nvGraphicFramePr>
         <p:xfrm>
           <a:off x="623455" y="1315234"/>
-          <a:ext cx="10972800" cy="2225040"/>
+          <a:ext cx="10972800" cy="3337560"/>
         </p:xfrm>
         <a:graphic>
           <a:graphicData uri="http://schemas.openxmlformats.org/drawingml/2006/table">
@@ -17400,21 +17769,21 @@
                 <a:tableStyleId>{BC89EF96-8CEA-46FF-86C4-4CE0E7609802}</a:tableStyleId>
               </a:tblPr>
               <a:tblGrid>
-                <a:gridCol w="7837714">
+                <a:gridCol w="7034645">
                   <a:extLst>
                     <a:ext uri="{9D8B030D-6E8A-4147-A177-3AD203B41FA5}">
                       <a16:colId xmlns:a16="http://schemas.microsoft.com/office/drawing/2014/main" val="3675253430"/>
                     </a:ext>
                   </a:extLst>
                 </a:gridCol>
-                <a:gridCol w="1567543">
+                <a:gridCol w="1866900">
                   <a:extLst>
                     <a:ext uri="{9D8B030D-6E8A-4147-A177-3AD203B41FA5}">
                       <a16:colId xmlns:a16="http://schemas.microsoft.com/office/drawing/2014/main" val="1372058784"/>
                     </a:ext>
                   </a:extLst>
                 </a:gridCol>
-                <a:gridCol w="1567543">
+                <a:gridCol w="2071255">
                   <a:extLst>
                     <a:ext uri="{9D8B030D-6E8A-4147-A177-3AD203B41FA5}">
                       <a16:colId xmlns:a16="http://schemas.microsoft.com/office/drawing/2014/main" val="356583018"/>
@@ -17430,7 +17799,7 @@
                     <a:p>
                       <a:r>
                         <a:rPr lang="en-US" dirty="0"/>
-                        <a:t>Component</a:t>
+                        <a:t>Component (Components to Purchase are Hyperlinked!)</a:t>
                       </a:r>
                     </a:p>
                   </a:txBody>
@@ -17475,8 +17844,124 @@
                     <a:lstStyle/>
                     <a:p>
                       <a:r>
+                        <a:rPr lang="en-US" dirty="0">
+                          <a:solidFill>
+                            <a:schemeClr val="tx1"/>
+                          </a:solidFill>
+                          <a:hlinkClick r:id="rId2">
+                            <a:extLst>
+                              <a:ext uri="{A12FA001-AC4F-418D-AE19-62706E023703}">
+                                <ahyp:hlinkClr xmlns:ahyp="http://schemas.microsoft.com/office/drawing/2018/hyperlinkcolor" val="tx"/>
+                              </a:ext>
+                            </a:extLst>
+                          </a:hlinkClick>
+                        </a:rPr>
+                        <a:t>Arcade LED Buttons</a:t>
+                      </a:r>
+                      <a:endParaRPr lang="en-US" dirty="0">
+                        <a:solidFill>
+                          <a:schemeClr val="tx1"/>
+                        </a:solidFill>
+                      </a:endParaRPr>
+                    </a:p>
+                  </a:txBody>
+                  <a:tcPr/>
+                </a:tc>
+                <a:tc>
+                  <a:txBody>
+                    <a:bodyPr/>
+                    <a:lstStyle/>
+                    <a:p>
+                      <a:r>
                         <a:rPr lang="en-US" dirty="0"/>
-                        <a:t>LEDs, 5 different colors</a:t>
+                        <a:t>Yes</a:t>
+                      </a:r>
+                    </a:p>
+                  </a:txBody>
+                  <a:tcPr/>
+                </a:tc>
+                <a:tc>
+                  <a:txBody>
+                    <a:bodyPr/>
+                    <a:lstStyle/>
+                    <a:p>
+                      <a:r>
+                        <a:rPr lang="en-US" dirty="0"/>
+                        <a:t>$11.88</a:t>
+                      </a:r>
+                    </a:p>
+                  </a:txBody>
+                  <a:tcPr/>
+                </a:tc>
+                <a:extLst>
+                  <a:ext uri="{0D108BD9-81ED-4DB2-BD59-A6C34878D82A}">
+                    <a16:rowId xmlns:a16="http://schemas.microsoft.com/office/drawing/2014/main" val="33313506"/>
+                  </a:ext>
+                </a:extLst>
+              </a:tr>
+              <a:tr h="370840">
+                <a:tc>
+                  <a:txBody>
+                    <a:bodyPr/>
+                    <a:lstStyle/>
+                    <a:p>
+                      <a:r>
+                        <a:rPr lang="en-US" dirty="0">
+                          <a:solidFill>
+                            <a:schemeClr val="tx1"/>
+                          </a:solidFill>
+                        </a:rPr>
+                        <a:t>Transistors for LEDs*</a:t>
+                      </a:r>
+                    </a:p>
+                  </a:txBody>
+                  <a:tcPr/>
+                </a:tc>
+                <a:tc>
+                  <a:txBody>
+                    <a:bodyPr/>
+                    <a:lstStyle/>
+                    <a:p>
+                      <a:r>
+                        <a:rPr lang="en-US" dirty="0"/>
+                        <a:t>Yes</a:t>
+                      </a:r>
+                    </a:p>
+                  </a:txBody>
+                  <a:tcPr/>
+                </a:tc>
+                <a:tc>
+                  <a:txBody>
+                    <a:bodyPr/>
+                    <a:lstStyle/>
+                    <a:p>
+                      <a:r>
+                        <a:rPr lang="en-US" dirty="0"/>
+                        <a:t>TBD</a:t>
+                      </a:r>
+                    </a:p>
+                  </a:txBody>
+                  <a:tcPr/>
+                </a:tc>
+                <a:extLst>
+                  <a:ext uri="{0D108BD9-81ED-4DB2-BD59-A6C34878D82A}">
+                    <a16:rowId xmlns:a16="http://schemas.microsoft.com/office/drawing/2014/main" val="2938192993"/>
+                  </a:ext>
+                </a:extLst>
+              </a:tr>
+              <a:tr h="370840">
+                <a:tc>
+                  <a:txBody>
+                    <a:bodyPr/>
+                    <a:lstStyle/>
+                    <a:p>
+                      <a:r>
+                        <a:rPr lang="en-US" dirty="0">
+                          <a:solidFill>
+                            <a:schemeClr val="tx1"/>
+                          </a:solidFill>
+                        </a:rPr>
+                        <a:t>Resistors</a:t>
                       </a:r>
                     </a:p>
                   </a:txBody>
@@ -17510,7 +17995,7 @@
                 </a:tc>
                 <a:extLst>
                   <a:ext uri="{0D108BD9-81ED-4DB2-BD59-A6C34878D82A}">
-                    <a16:rowId xmlns:a16="http://schemas.microsoft.com/office/drawing/2014/main" val="33313506"/>
+                    <a16:rowId xmlns:a16="http://schemas.microsoft.com/office/drawing/2014/main" val="712865459"/>
                   </a:ext>
                 </a:extLst>
               </a:tr>
@@ -17521,8 +18006,74 @@
                     <a:lstStyle/>
                     <a:p>
                       <a:r>
+                        <a:rPr lang="en-US" dirty="0">
+                          <a:solidFill>
+                            <a:schemeClr val="tx1"/>
+                          </a:solidFill>
+                          <a:hlinkClick r:id="rId3">
+                            <a:extLst>
+                              <a:ext uri="{A12FA001-AC4F-418D-AE19-62706E023703}">
+                                <ahyp:hlinkClr xmlns:ahyp="http://schemas.microsoft.com/office/drawing/2018/hyperlinkcolor" val="tx"/>
+                              </a:ext>
+                            </a:extLst>
+                          </a:hlinkClick>
+                        </a:rPr>
+                        <a:t>USB Speaker</a:t>
+                      </a:r>
+                      <a:endParaRPr lang="en-US" dirty="0">
+                        <a:solidFill>
+                          <a:schemeClr val="tx1"/>
+                        </a:solidFill>
+                      </a:endParaRPr>
+                    </a:p>
+                  </a:txBody>
+                  <a:tcPr/>
+                </a:tc>
+                <a:tc>
+                  <a:txBody>
+                    <a:bodyPr/>
+                    <a:lstStyle/>
+                    <a:p>
+                      <a:r>
                         <a:rPr lang="en-US" dirty="0"/>
-                        <a:t>Buttons, 5 different colors</a:t>
+                        <a:t>Yes</a:t>
+                      </a:r>
+                    </a:p>
+                  </a:txBody>
+                  <a:tcPr/>
+                </a:tc>
+                <a:tc>
+                  <a:txBody>
+                    <a:bodyPr/>
+                    <a:lstStyle/>
+                    <a:p>
+                      <a:r>
+                        <a:rPr lang="en-US" dirty="0"/>
+                        <a:t>$15.98 (On Sale!)</a:t>
+                      </a:r>
+                    </a:p>
+                  </a:txBody>
+                  <a:tcPr/>
+                </a:tc>
+                <a:extLst>
+                  <a:ext uri="{0D108BD9-81ED-4DB2-BD59-A6C34878D82A}">
+                    <a16:rowId xmlns:a16="http://schemas.microsoft.com/office/drawing/2014/main" val="2595126612"/>
+                  </a:ext>
+                </a:extLst>
+              </a:tr>
+              <a:tr h="370840">
+                <a:tc>
+                  <a:txBody>
+                    <a:bodyPr/>
+                    <a:lstStyle/>
+                    <a:p>
+                      <a:r>
+                        <a:rPr lang="en-US" dirty="0">
+                          <a:solidFill>
+                            <a:schemeClr val="tx1"/>
+                          </a:solidFill>
+                        </a:rPr>
+                        <a:t>USB Adapter</a:t>
                       </a:r>
                     </a:p>
                   </a:txBody>
@@ -17556,7 +18107,7 @@
                 </a:tc>
                 <a:extLst>
                   <a:ext uri="{0D108BD9-81ED-4DB2-BD59-A6C34878D82A}">
-                    <a16:rowId xmlns:a16="http://schemas.microsoft.com/office/drawing/2014/main" val="2595126612"/>
+                    <a16:rowId xmlns:a16="http://schemas.microsoft.com/office/drawing/2014/main" val="2341908267"/>
                   </a:ext>
                 </a:extLst>
               </a:tr>
@@ -17567,8 +18118,136 @@
                     <a:lstStyle/>
                     <a:p>
                       <a:r>
+                        <a:rPr lang="en-US" dirty="0">
+                          <a:solidFill>
+                            <a:schemeClr val="tx1"/>
+                          </a:solidFill>
+                          <a:hlinkClick r:id="rId4">
+                            <a:extLst>
+                              <a:ext uri="{A12FA001-AC4F-418D-AE19-62706E023703}">
+                                <ahyp:hlinkClr xmlns:ahyp="http://schemas.microsoft.com/office/drawing/2018/hyperlinkcolor" val="tx"/>
+                              </a:ext>
+                            </a:extLst>
+                          </a:hlinkClick>
+                        </a:rPr>
+                        <a:t>SPI Screen</a:t>
+                      </a:r>
+                      <a:endParaRPr lang="en-US" dirty="0">
+                        <a:solidFill>
+                          <a:schemeClr val="tx1"/>
+                        </a:solidFill>
+                      </a:endParaRPr>
+                    </a:p>
+                  </a:txBody>
+                  <a:tcPr/>
+                </a:tc>
+                <a:tc>
+                  <a:txBody>
+                    <a:bodyPr/>
+                    <a:lstStyle/>
+                    <a:p>
+                      <a:r>
                         <a:rPr lang="en-US" dirty="0"/>
-                        <a:t>Resistors, 10</a:t>
+                        <a:t>Yes</a:t>
+                      </a:r>
+                    </a:p>
+                  </a:txBody>
+                  <a:tcPr/>
+                </a:tc>
+                <a:tc>
+                  <a:txBody>
+                    <a:bodyPr/>
+                    <a:lstStyle/>
+                    <a:p>
+                      <a:r>
+                        <a:rPr lang="en-US" dirty="0"/>
+                        <a:t>$29.95</a:t>
+                      </a:r>
+                    </a:p>
+                  </a:txBody>
+                  <a:tcPr/>
+                </a:tc>
+                <a:extLst>
+                  <a:ext uri="{0D108BD9-81ED-4DB2-BD59-A6C34878D82A}">
+                    <a16:rowId xmlns:a16="http://schemas.microsoft.com/office/drawing/2014/main" val="1757493575"/>
+                  </a:ext>
+                </a:extLst>
+              </a:tr>
+              <a:tr h="370840">
+                <a:tc>
+                  <a:txBody>
+                    <a:bodyPr/>
+                    <a:lstStyle/>
+                    <a:p>
+                      <a:r>
+                        <a:rPr lang="en-US" dirty="0">
+                          <a:solidFill>
+                            <a:schemeClr val="tx1"/>
+                          </a:solidFill>
+                          <a:hlinkClick r:id="rId5">
+                            <a:extLst>
+                              <a:ext uri="{A12FA001-AC4F-418D-AE19-62706E023703}">
+                                <ahyp:hlinkClr xmlns:ahyp="http://schemas.microsoft.com/office/drawing/2018/hyperlinkcolor" val="tx"/>
+                              </a:ext>
+                            </a:extLst>
+                          </a:hlinkClick>
+                        </a:rPr>
+                        <a:t>Resistive Touch Screen Controller</a:t>
+                      </a:r>
+                      <a:endParaRPr lang="en-US" dirty="0">
+                        <a:solidFill>
+                          <a:schemeClr val="tx1"/>
+                        </a:solidFill>
+                      </a:endParaRPr>
+                    </a:p>
+                  </a:txBody>
+                  <a:tcPr/>
+                </a:tc>
+                <a:tc>
+                  <a:txBody>
+                    <a:bodyPr/>
+                    <a:lstStyle/>
+                    <a:p>
+                      <a:r>
+                        <a:rPr lang="en-US" dirty="0"/>
+                        <a:t>Yes</a:t>
+                      </a:r>
+                    </a:p>
+                  </a:txBody>
+                  <a:tcPr/>
+                </a:tc>
+                <a:tc>
+                  <a:txBody>
+                    <a:bodyPr/>
+                    <a:lstStyle/>
+                    <a:p>
+                      <a:r>
+                        <a:rPr lang="en-US" dirty="0"/>
+                        <a:t>$4.95</a:t>
+                      </a:r>
+                    </a:p>
+                  </a:txBody>
+                  <a:tcPr/>
+                </a:tc>
+                <a:extLst>
+                  <a:ext uri="{0D108BD9-81ED-4DB2-BD59-A6C34878D82A}">
+                    <a16:rowId xmlns:a16="http://schemas.microsoft.com/office/drawing/2014/main" val="2909563057"/>
+                  </a:ext>
+                </a:extLst>
+              </a:tr>
+              <a:tr h="370840">
+                <a:tc>
+                  <a:txBody>
+                    <a:bodyPr/>
+                    <a:lstStyle/>
+                    <a:p>
+                      <a:r>
+                        <a:rPr lang="en-US" dirty="0">
+                          <a:solidFill>
+                            <a:schemeClr val="tx1"/>
+                          </a:solidFill>
+                        </a:rPr>
+                        <a:t>Buzzer</a:t>
                       </a:r>
                     </a:p>
                   </a:txBody>
@@ -17602,130 +18281,6 @@
                 </a:tc>
                 <a:extLst>
                   <a:ext uri="{0D108BD9-81ED-4DB2-BD59-A6C34878D82A}">
-                    <a16:rowId xmlns:a16="http://schemas.microsoft.com/office/drawing/2014/main" val="1757493575"/>
-                  </a:ext>
-                </a:extLst>
-              </a:tr>
-              <a:tr h="370840">
-                <a:tc>
-                  <a:txBody>
-                    <a:bodyPr/>
-                    <a:lstStyle/>
-                    <a:p>
-                      <a:r>
-                        <a:rPr lang="en-US" dirty="0">
-                          <a:solidFill>
-                            <a:schemeClr val="tx1"/>
-                          </a:solidFill>
-                          <a:hlinkClick r:id="rId2">
-                            <a:extLst>
-                              <a:ext uri="{A12FA001-AC4F-418D-AE19-62706E023703}">
-                                <ahyp:hlinkClr xmlns:ahyp="http://schemas.microsoft.com/office/drawing/2018/hyperlinkcolor" val="tx"/>
-                              </a:ext>
-                            </a:extLst>
-                          </a:hlinkClick>
-                        </a:rPr>
-                        <a:t>Slide Power Switch</a:t>
-                      </a:r>
-                      <a:endParaRPr lang="en-US" dirty="0">
-                        <a:solidFill>
-                          <a:schemeClr val="tx1"/>
-                        </a:solidFill>
-                      </a:endParaRPr>
-                    </a:p>
-                  </a:txBody>
-                  <a:tcPr/>
-                </a:tc>
-                <a:tc>
-                  <a:txBody>
-                    <a:bodyPr/>
-                    <a:lstStyle/>
-                    <a:p>
-                      <a:r>
-                        <a:rPr lang="en-US" dirty="0"/>
-                        <a:t>Yes</a:t>
-                      </a:r>
-                    </a:p>
-                  </a:txBody>
-                  <a:tcPr/>
-                </a:tc>
-                <a:tc>
-                  <a:txBody>
-                    <a:bodyPr/>
-                    <a:lstStyle/>
-                    <a:p>
-                      <a:r>
-                        <a:rPr lang="en-US" dirty="0"/>
-                        <a:t>$1.60</a:t>
-                      </a:r>
-                    </a:p>
-                  </a:txBody>
-                  <a:tcPr/>
-                </a:tc>
-                <a:extLst>
-                  <a:ext uri="{0D108BD9-81ED-4DB2-BD59-A6C34878D82A}">
-                    <a16:rowId xmlns:a16="http://schemas.microsoft.com/office/drawing/2014/main" val="3862840897"/>
-                  </a:ext>
-                </a:extLst>
-              </a:tr>
-              <a:tr h="370840">
-                <a:tc>
-                  <a:txBody>
-                    <a:bodyPr/>
-                    <a:lstStyle/>
-                    <a:p>
-                      <a:r>
-                        <a:rPr lang="en-US" dirty="0">
-                          <a:solidFill>
-                            <a:schemeClr val="tx1"/>
-                          </a:solidFill>
-                          <a:hlinkClick r:id="rId3">
-                            <a:extLst>
-                              <a:ext uri="{A12FA001-AC4F-418D-AE19-62706E023703}">
-                                <ahyp:hlinkClr xmlns:ahyp="http://schemas.microsoft.com/office/drawing/2018/hyperlinkcolor" val="tx"/>
-                              </a:ext>
-                            </a:extLst>
-                          </a:hlinkClick>
-                        </a:rPr>
-                        <a:t>Speaker</a:t>
-                      </a:r>
-                      <a:endParaRPr lang="en-US" dirty="0">
-                        <a:solidFill>
-                          <a:schemeClr val="tx1"/>
-                        </a:solidFill>
-                      </a:endParaRPr>
-                    </a:p>
-                  </a:txBody>
-                  <a:tcPr/>
-                </a:tc>
-                <a:tc>
-                  <a:txBody>
-                    <a:bodyPr/>
-                    <a:lstStyle/>
-                    <a:p>
-                      <a:r>
-                        <a:rPr lang="en-US" dirty="0"/>
-                        <a:t>Yes</a:t>
-                      </a:r>
-                    </a:p>
-                  </a:txBody>
-                  <a:tcPr/>
-                </a:tc>
-                <a:tc>
-                  <a:txBody>
-                    <a:bodyPr/>
-                    <a:lstStyle/>
-                    <a:p>
-                      <a:r>
-                        <a:rPr lang="en-US" dirty="0"/>
-                        <a:t>$2.95</a:t>
-                      </a:r>
-                    </a:p>
-                  </a:txBody>
-                  <a:tcPr/>
-                </a:tc>
-                <a:extLst>
-                  <a:ext uri="{0D108BD9-81ED-4DB2-BD59-A6C34878D82A}">
                     <a16:rowId xmlns:a16="http://schemas.microsoft.com/office/drawing/2014/main" val="1698356184"/>
                   </a:ext>
                 </a:extLst>
@@ -17748,8 +18303,8 @@
         </p:nvSpPr>
         <p:spPr>
           <a:xfrm>
-            <a:off x="609600" y="3645406"/>
-            <a:ext cx="4532010" cy="369332"/>
+            <a:off x="609600" y="4656258"/>
+            <a:ext cx="9473619" cy="369332"/>
           </a:xfrm>
           <a:prstGeom prst="rect">
             <a:avLst/>
@@ -17764,51 +18319,7 @@
           <a:p>
             <a:r>
               <a:rPr lang="en-US" dirty="0"/>
-              <a:t>Components to Purchase are Hyperlinked!</a:t>
-            </a:r>
-          </a:p>
-        </p:txBody>
-      </p:sp>
-      <p:sp>
-        <p:nvSpPr>
-          <p:cNvPr id="3" name="TextBox 2">
-            <a:extLst>
-              <a:ext uri="{FF2B5EF4-FFF2-40B4-BE49-F238E27FC236}">
-                <a16:creationId xmlns:a16="http://schemas.microsoft.com/office/drawing/2014/main" id="{7AEE488D-3A96-EB4C-0609-44E919F466B7}"/>
-              </a:ext>
-            </a:extLst>
-          </p:cNvPr>
-          <p:cNvSpPr txBox="1"/>
-          <p:nvPr/>
-        </p:nvSpPr>
-        <p:spPr>
-          <a:xfrm>
-            <a:off x="595745" y="4186972"/>
-            <a:ext cx="10972800" cy="2031325"/>
-          </a:xfrm>
-          <a:prstGeom prst="rect">
-            <a:avLst/>
-          </a:prstGeom>
-          <a:noFill/>
-        </p:spPr>
-        <p:txBody>
-          <a:bodyPr wrap="square" rtlCol="0">
-            <a:spAutoFit/>
-          </a:bodyPr>
-          <a:lstStyle/>
-          <a:p>
-            <a:r>
-              <a:rPr lang="en-US" dirty="0"/>
-              <a:t>Note: The slide switch will be to change between ”learn” and “practice” mode. “Learn” mode will use the LED light sequence to teach the user the song, while “practice” mode will allow the user to just play the keys as they want. </a:t>
-            </a:r>
-          </a:p>
-          <a:p>
-            <a:endParaRPr lang="en-US" dirty="0"/>
-          </a:p>
-          <a:p>
-            <a:r>
-              <a:rPr lang="en-US" dirty="0"/>
-              <a:t>Note: If I need to increase the complexity of my project, one idea I have is to add a potentiometer to vary how long the LEDs are illuminating. This will allow users to modulate how difficult memorization of the light sequence is. </a:t>
+              <a:t>*Professor Welsh will choose which transistors to buy and I will update this list accordingly. </a:t>
             </a:r>
           </a:p>
         </p:txBody>

</xml_diff>